<commit_message>
my part of sliders prepared
</commit_message>
<xml_diff>
--- a/presentation/Enjoy-SQL.pptx
+++ b/presentation/Enjoy-SQL.pptx
@@ -115,6 +115,2994 @@
 </p:presentation>
 </file>
 
+<file path=ppt/diagrams/colors1.xml><?xml version="1.0" encoding="utf-8"?>
+<dgm:colorsDef xmlns:dgm="http://schemas.openxmlformats.org/drawingml/2006/diagram" xmlns:a="http://schemas.openxmlformats.org/drawingml/2006/main" uniqueId="urn:microsoft.com/office/officeart/2005/8/colors/accent1_2">
+  <dgm:title val=""/>
+  <dgm:desc val=""/>
+  <dgm:catLst>
+    <dgm:cat type="accent1" pri="11200"/>
+  </dgm:catLst>
+  <dgm:styleLbl name="node0">
+    <dgm:fillClrLst meth="repeat">
+      <a:schemeClr val="accent1"/>
+    </dgm:fillClrLst>
+    <dgm:linClrLst meth="repeat">
+      <a:schemeClr val="lt1"/>
+    </dgm:linClrLst>
+    <dgm:effectClrLst/>
+    <dgm:txLinClrLst/>
+    <dgm:txFillClrLst/>
+    <dgm:txEffectClrLst/>
+  </dgm:styleLbl>
+  <dgm:styleLbl name="alignNode1">
+    <dgm:fillClrLst meth="repeat">
+      <a:schemeClr val="accent1"/>
+    </dgm:fillClrLst>
+    <dgm:linClrLst meth="repeat">
+      <a:schemeClr val="accent1"/>
+    </dgm:linClrLst>
+    <dgm:effectClrLst/>
+    <dgm:txLinClrLst/>
+    <dgm:txFillClrLst/>
+    <dgm:txEffectClrLst/>
+  </dgm:styleLbl>
+  <dgm:styleLbl name="node1">
+    <dgm:fillClrLst meth="repeat">
+      <a:schemeClr val="accent1"/>
+    </dgm:fillClrLst>
+    <dgm:linClrLst meth="repeat">
+      <a:schemeClr val="lt1"/>
+    </dgm:linClrLst>
+    <dgm:effectClrLst/>
+    <dgm:txLinClrLst/>
+    <dgm:txFillClrLst/>
+    <dgm:txEffectClrLst/>
+  </dgm:styleLbl>
+  <dgm:styleLbl name="lnNode1">
+    <dgm:fillClrLst meth="repeat">
+      <a:schemeClr val="accent1"/>
+    </dgm:fillClrLst>
+    <dgm:linClrLst meth="repeat">
+      <a:schemeClr val="lt1"/>
+    </dgm:linClrLst>
+    <dgm:effectClrLst/>
+    <dgm:txLinClrLst/>
+    <dgm:txFillClrLst/>
+    <dgm:txEffectClrLst/>
+  </dgm:styleLbl>
+  <dgm:styleLbl name="vennNode1">
+    <dgm:fillClrLst meth="repeat">
+      <a:schemeClr val="accent1">
+        <a:alpha val="50000"/>
+      </a:schemeClr>
+    </dgm:fillClrLst>
+    <dgm:linClrLst meth="repeat">
+      <a:schemeClr val="lt1"/>
+    </dgm:linClrLst>
+    <dgm:effectClrLst/>
+    <dgm:txLinClrLst/>
+    <dgm:txFillClrLst/>
+    <dgm:txEffectClrLst/>
+  </dgm:styleLbl>
+  <dgm:styleLbl name="node2">
+    <dgm:fillClrLst meth="repeat">
+      <a:schemeClr val="accent1"/>
+    </dgm:fillClrLst>
+    <dgm:linClrLst meth="repeat">
+      <a:schemeClr val="lt1"/>
+    </dgm:linClrLst>
+    <dgm:effectClrLst/>
+    <dgm:txLinClrLst/>
+    <dgm:txFillClrLst/>
+    <dgm:txEffectClrLst/>
+  </dgm:styleLbl>
+  <dgm:styleLbl name="node3">
+    <dgm:fillClrLst meth="repeat">
+      <a:schemeClr val="accent1"/>
+    </dgm:fillClrLst>
+    <dgm:linClrLst meth="repeat">
+      <a:schemeClr val="lt1"/>
+    </dgm:linClrLst>
+    <dgm:effectClrLst/>
+    <dgm:txLinClrLst/>
+    <dgm:txFillClrLst/>
+    <dgm:txEffectClrLst/>
+  </dgm:styleLbl>
+  <dgm:styleLbl name="node4">
+    <dgm:fillClrLst meth="repeat">
+      <a:schemeClr val="accent1"/>
+    </dgm:fillClrLst>
+    <dgm:linClrLst meth="repeat">
+      <a:schemeClr val="lt1"/>
+    </dgm:linClrLst>
+    <dgm:effectClrLst/>
+    <dgm:txLinClrLst/>
+    <dgm:txFillClrLst/>
+    <dgm:txEffectClrLst/>
+  </dgm:styleLbl>
+  <dgm:styleLbl name="fgImgPlace1">
+    <dgm:fillClrLst meth="repeat">
+      <a:schemeClr val="accent1">
+        <a:tint val="50000"/>
+      </a:schemeClr>
+    </dgm:fillClrLst>
+    <dgm:linClrLst meth="repeat">
+      <a:schemeClr val="lt1"/>
+    </dgm:linClrLst>
+    <dgm:effectClrLst/>
+    <dgm:txLinClrLst/>
+    <dgm:txFillClrLst meth="repeat">
+      <a:schemeClr val="lt1"/>
+    </dgm:txFillClrLst>
+    <dgm:txEffectClrLst/>
+  </dgm:styleLbl>
+  <dgm:styleLbl name="alignImgPlace1">
+    <dgm:fillClrLst meth="repeat">
+      <a:schemeClr val="accent1">
+        <a:tint val="50000"/>
+      </a:schemeClr>
+    </dgm:fillClrLst>
+    <dgm:linClrLst meth="repeat">
+      <a:schemeClr val="lt1"/>
+    </dgm:linClrLst>
+    <dgm:effectClrLst/>
+    <dgm:txLinClrLst/>
+    <dgm:txFillClrLst meth="repeat">
+      <a:schemeClr val="lt1"/>
+    </dgm:txFillClrLst>
+    <dgm:txEffectClrLst/>
+  </dgm:styleLbl>
+  <dgm:styleLbl name="bgImgPlace1">
+    <dgm:fillClrLst meth="repeat">
+      <a:schemeClr val="accent1">
+        <a:tint val="50000"/>
+      </a:schemeClr>
+    </dgm:fillClrLst>
+    <dgm:linClrLst meth="repeat">
+      <a:schemeClr val="lt1"/>
+    </dgm:linClrLst>
+    <dgm:effectClrLst/>
+    <dgm:txLinClrLst/>
+    <dgm:txFillClrLst meth="repeat">
+      <a:schemeClr val="lt1"/>
+    </dgm:txFillClrLst>
+    <dgm:txEffectClrLst/>
+  </dgm:styleLbl>
+  <dgm:styleLbl name="sibTrans2D1">
+    <dgm:fillClrLst meth="repeat">
+      <a:schemeClr val="accent1">
+        <a:tint val="60000"/>
+      </a:schemeClr>
+    </dgm:fillClrLst>
+    <dgm:linClrLst meth="repeat">
+      <a:schemeClr val="accent1">
+        <a:tint val="60000"/>
+      </a:schemeClr>
+    </dgm:linClrLst>
+    <dgm:effectClrLst/>
+    <dgm:txLinClrLst/>
+    <dgm:txFillClrLst/>
+    <dgm:txEffectClrLst/>
+  </dgm:styleLbl>
+  <dgm:styleLbl name="fgSibTrans2D1">
+    <dgm:fillClrLst meth="repeat">
+      <a:schemeClr val="accent1">
+        <a:tint val="60000"/>
+      </a:schemeClr>
+    </dgm:fillClrLst>
+    <dgm:linClrLst meth="repeat">
+      <a:schemeClr val="accent1">
+        <a:tint val="60000"/>
+      </a:schemeClr>
+    </dgm:linClrLst>
+    <dgm:effectClrLst/>
+    <dgm:txLinClrLst/>
+    <dgm:txFillClrLst/>
+    <dgm:txEffectClrLst/>
+  </dgm:styleLbl>
+  <dgm:styleLbl name="bgSibTrans2D1">
+    <dgm:fillClrLst meth="repeat">
+      <a:schemeClr val="accent1">
+        <a:tint val="60000"/>
+      </a:schemeClr>
+    </dgm:fillClrLst>
+    <dgm:linClrLst meth="repeat">
+      <a:schemeClr val="accent1">
+        <a:tint val="60000"/>
+      </a:schemeClr>
+    </dgm:linClrLst>
+    <dgm:effectClrLst/>
+    <dgm:txLinClrLst/>
+    <dgm:txFillClrLst/>
+    <dgm:txEffectClrLst/>
+  </dgm:styleLbl>
+  <dgm:styleLbl name="sibTrans1D1">
+    <dgm:fillClrLst meth="repeat">
+      <a:schemeClr val="accent1"/>
+    </dgm:fillClrLst>
+    <dgm:linClrLst meth="repeat">
+      <a:schemeClr val="accent1"/>
+    </dgm:linClrLst>
+    <dgm:effectClrLst/>
+    <dgm:txLinClrLst/>
+    <dgm:txFillClrLst meth="repeat">
+      <a:schemeClr val="tx1"/>
+    </dgm:txFillClrLst>
+    <dgm:txEffectClrLst/>
+  </dgm:styleLbl>
+  <dgm:styleLbl name="callout">
+    <dgm:fillClrLst meth="repeat">
+      <a:schemeClr val="accent1"/>
+    </dgm:fillClrLst>
+    <dgm:linClrLst meth="repeat">
+      <a:schemeClr val="accent1">
+        <a:tint val="50000"/>
+      </a:schemeClr>
+    </dgm:linClrLst>
+    <dgm:effectClrLst/>
+    <dgm:txLinClrLst/>
+    <dgm:txFillClrLst meth="repeat">
+      <a:schemeClr val="tx1"/>
+    </dgm:txFillClrLst>
+    <dgm:txEffectClrLst/>
+  </dgm:styleLbl>
+  <dgm:styleLbl name="asst0">
+    <dgm:fillClrLst meth="repeat">
+      <a:schemeClr val="accent1"/>
+    </dgm:fillClrLst>
+    <dgm:linClrLst meth="repeat">
+      <a:schemeClr val="lt1"/>
+    </dgm:linClrLst>
+    <dgm:effectClrLst/>
+    <dgm:txLinClrLst/>
+    <dgm:txFillClrLst/>
+    <dgm:txEffectClrLst/>
+  </dgm:styleLbl>
+  <dgm:styleLbl name="asst1">
+    <dgm:fillClrLst meth="repeat">
+      <a:schemeClr val="accent1"/>
+    </dgm:fillClrLst>
+    <dgm:linClrLst meth="repeat">
+      <a:schemeClr val="lt1"/>
+    </dgm:linClrLst>
+    <dgm:effectClrLst/>
+    <dgm:txLinClrLst/>
+    <dgm:txFillClrLst/>
+    <dgm:txEffectClrLst/>
+  </dgm:styleLbl>
+  <dgm:styleLbl name="asst2">
+    <dgm:fillClrLst meth="repeat">
+      <a:schemeClr val="accent1"/>
+    </dgm:fillClrLst>
+    <dgm:linClrLst meth="repeat">
+      <a:schemeClr val="lt1"/>
+    </dgm:linClrLst>
+    <dgm:effectClrLst/>
+    <dgm:txLinClrLst/>
+    <dgm:txFillClrLst/>
+    <dgm:txEffectClrLst/>
+  </dgm:styleLbl>
+  <dgm:styleLbl name="asst3">
+    <dgm:fillClrLst meth="repeat">
+      <a:schemeClr val="accent1"/>
+    </dgm:fillClrLst>
+    <dgm:linClrLst meth="repeat">
+      <a:schemeClr val="lt1"/>
+    </dgm:linClrLst>
+    <dgm:effectClrLst/>
+    <dgm:txLinClrLst/>
+    <dgm:txFillClrLst/>
+    <dgm:txEffectClrLst/>
+  </dgm:styleLbl>
+  <dgm:styleLbl name="asst4">
+    <dgm:fillClrLst meth="repeat">
+      <a:schemeClr val="accent1"/>
+    </dgm:fillClrLst>
+    <dgm:linClrLst meth="repeat">
+      <a:schemeClr val="lt1"/>
+    </dgm:linClrLst>
+    <dgm:effectClrLst/>
+    <dgm:txLinClrLst/>
+    <dgm:txFillClrLst/>
+    <dgm:txEffectClrLst/>
+  </dgm:styleLbl>
+  <dgm:styleLbl name="parChTrans2D1">
+    <dgm:fillClrLst meth="repeat">
+      <a:schemeClr val="accent1">
+        <a:tint val="60000"/>
+      </a:schemeClr>
+    </dgm:fillClrLst>
+    <dgm:linClrLst meth="repeat">
+      <a:schemeClr val="accent1">
+        <a:tint val="60000"/>
+      </a:schemeClr>
+    </dgm:linClrLst>
+    <dgm:effectClrLst/>
+    <dgm:txLinClrLst/>
+    <dgm:txFillClrLst meth="repeat">
+      <a:schemeClr val="lt1"/>
+    </dgm:txFillClrLst>
+    <dgm:txEffectClrLst/>
+  </dgm:styleLbl>
+  <dgm:styleLbl name="parChTrans2D2">
+    <dgm:fillClrLst meth="repeat">
+      <a:schemeClr val="accent1"/>
+    </dgm:fillClrLst>
+    <dgm:linClrLst meth="repeat">
+      <a:schemeClr val="accent1"/>
+    </dgm:linClrLst>
+    <dgm:effectClrLst/>
+    <dgm:txLinClrLst/>
+    <dgm:txFillClrLst meth="repeat">
+      <a:schemeClr val="lt1"/>
+    </dgm:txFillClrLst>
+    <dgm:txEffectClrLst/>
+  </dgm:styleLbl>
+  <dgm:styleLbl name="parChTrans2D3">
+    <dgm:fillClrLst meth="repeat">
+      <a:schemeClr val="accent1"/>
+    </dgm:fillClrLst>
+    <dgm:linClrLst meth="repeat">
+      <a:schemeClr val="accent1"/>
+    </dgm:linClrLst>
+    <dgm:effectClrLst/>
+    <dgm:txLinClrLst/>
+    <dgm:txFillClrLst meth="repeat">
+      <a:schemeClr val="lt1"/>
+    </dgm:txFillClrLst>
+    <dgm:txEffectClrLst/>
+  </dgm:styleLbl>
+  <dgm:styleLbl name="parChTrans2D4">
+    <dgm:fillClrLst meth="repeat">
+      <a:schemeClr val="accent1"/>
+    </dgm:fillClrLst>
+    <dgm:linClrLst meth="repeat">
+      <a:schemeClr val="accent1"/>
+    </dgm:linClrLst>
+    <dgm:effectClrLst/>
+    <dgm:txLinClrLst/>
+    <dgm:txFillClrLst meth="repeat">
+      <a:schemeClr val="lt1"/>
+    </dgm:txFillClrLst>
+    <dgm:txEffectClrLst/>
+  </dgm:styleLbl>
+  <dgm:styleLbl name="parChTrans1D1">
+    <dgm:fillClrLst meth="repeat">
+      <a:schemeClr val="accent1"/>
+    </dgm:fillClrLst>
+    <dgm:linClrLst meth="repeat">
+      <a:schemeClr val="accent1">
+        <a:shade val="60000"/>
+      </a:schemeClr>
+    </dgm:linClrLst>
+    <dgm:effectClrLst/>
+    <dgm:txLinClrLst/>
+    <dgm:txFillClrLst meth="repeat">
+      <a:schemeClr val="tx1"/>
+    </dgm:txFillClrLst>
+    <dgm:txEffectClrLst/>
+  </dgm:styleLbl>
+  <dgm:styleLbl name="parChTrans1D2">
+    <dgm:fillClrLst meth="repeat">
+      <a:schemeClr val="accent1"/>
+    </dgm:fillClrLst>
+    <dgm:linClrLst meth="repeat">
+      <a:schemeClr val="accent1">
+        <a:shade val="60000"/>
+      </a:schemeClr>
+    </dgm:linClrLst>
+    <dgm:effectClrLst/>
+    <dgm:txLinClrLst/>
+    <dgm:txFillClrLst meth="repeat">
+      <a:schemeClr val="tx1"/>
+    </dgm:txFillClrLst>
+    <dgm:txEffectClrLst/>
+  </dgm:styleLbl>
+  <dgm:styleLbl name="parChTrans1D3">
+    <dgm:fillClrLst meth="repeat">
+      <a:schemeClr val="accent1"/>
+    </dgm:fillClrLst>
+    <dgm:linClrLst meth="repeat">
+      <a:schemeClr val="accent1">
+        <a:shade val="80000"/>
+      </a:schemeClr>
+    </dgm:linClrLst>
+    <dgm:effectClrLst/>
+    <dgm:txLinClrLst/>
+    <dgm:txFillClrLst meth="repeat">
+      <a:schemeClr val="tx1"/>
+    </dgm:txFillClrLst>
+    <dgm:txEffectClrLst/>
+  </dgm:styleLbl>
+  <dgm:styleLbl name="parChTrans1D4">
+    <dgm:fillClrLst meth="repeat">
+      <a:schemeClr val="accent1"/>
+    </dgm:fillClrLst>
+    <dgm:linClrLst meth="repeat">
+      <a:schemeClr val="accent1">
+        <a:shade val="80000"/>
+      </a:schemeClr>
+    </dgm:linClrLst>
+    <dgm:effectClrLst/>
+    <dgm:txLinClrLst/>
+    <dgm:txFillClrLst meth="repeat">
+      <a:schemeClr val="tx1"/>
+    </dgm:txFillClrLst>
+    <dgm:txEffectClrLst/>
+  </dgm:styleLbl>
+  <dgm:styleLbl name="fgAcc1">
+    <dgm:fillClrLst meth="repeat">
+      <a:schemeClr val="lt1">
+        <a:alpha val="90000"/>
+      </a:schemeClr>
+    </dgm:fillClrLst>
+    <dgm:linClrLst meth="repeat">
+      <a:schemeClr val="accent1"/>
+    </dgm:linClrLst>
+    <dgm:effectClrLst/>
+    <dgm:txLinClrLst/>
+    <dgm:txFillClrLst meth="repeat">
+      <a:schemeClr val="dk1"/>
+    </dgm:txFillClrLst>
+    <dgm:txEffectClrLst/>
+  </dgm:styleLbl>
+  <dgm:styleLbl name="conFgAcc1">
+    <dgm:fillClrLst meth="repeat">
+      <a:schemeClr val="lt1">
+        <a:alpha val="90000"/>
+      </a:schemeClr>
+    </dgm:fillClrLst>
+    <dgm:linClrLst meth="repeat">
+      <a:schemeClr val="accent1"/>
+    </dgm:linClrLst>
+    <dgm:effectClrLst/>
+    <dgm:txLinClrLst/>
+    <dgm:txFillClrLst meth="repeat">
+      <a:schemeClr val="dk1"/>
+    </dgm:txFillClrLst>
+    <dgm:txEffectClrLst/>
+  </dgm:styleLbl>
+  <dgm:styleLbl name="alignAcc1">
+    <dgm:fillClrLst meth="repeat">
+      <a:schemeClr val="lt1">
+        <a:alpha val="90000"/>
+      </a:schemeClr>
+    </dgm:fillClrLst>
+    <dgm:linClrLst meth="repeat">
+      <a:schemeClr val="accent1"/>
+    </dgm:linClrLst>
+    <dgm:effectClrLst/>
+    <dgm:txLinClrLst/>
+    <dgm:txFillClrLst meth="repeat">
+      <a:schemeClr val="dk1"/>
+    </dgm:txFillClrLst>
+    <dgm:txEffectClrLst/>
+  </dgm:styleLbl>
+  <dgm:styleLbl name="trAlignAcc1">
+    <dgm:fillClrLst meth="repeat">
+      <a:schemeClr val="lt1">
+        <a:alpha val="40000"/>
+      </a:schemeClr>
+    </dgm:fillClrLst>
+    <dgm:linClrLst meth="repeat">
+      <a:schemeClr val="accent1"/>
+    </dgm:linClrLst>
+    <dgm:effectClrLst/>
+    <dgm:txLinClrLst/>
+    <dgm:txFillClrLst meth="repeat">
+      <a:schemeClr val="dk1"/>
+    </dgm:txFillClrLst>
+    <dgm:txEffectClrLst/>
+  </dgm:styleLbl>
+  <dgm:styleLbl name="bgAcc1">
+    <dgm:fillClrLst meth="repeat">
+      <a:schemeClr val="lt1">
+        <a:alpha val="90000"/>
+      </a:schemeClr>
+    </dgm:fillClrLst>
+    <dgm:linClrLst meth="repeat">
+      <a:schemeClr val="accent1"/>
+    </dgm:linClrLst>
+    <dgm:effectClrLst/>
+    <dgm:txLinClrLst/>
+    <dgm:txFillClrLst meth="repeat">
+      <a:schemeClr val="dk1"/>
+    </dgm:txFillClrLst>
+    <dgm:txEffectClrLst/>
+  </dgm:styleLbl>
+  <dgm:styleLbl name="solidFgAcc1">
+    <dgm:fillClrLst meth="repeat">
+      <a:schemeClr val="lt1"/>
+    </dgm:fillClrLst>
+    <dgm:linClrLst meth="repeat">
+      <a:schemeClr val="accent1"/>
+    </dgm:linClrLst>
+    <dgm:effectClrLst/>
+    <dgm:txLinClrLst/>
+    <dgm:txFillClrLst meth="repeat">
+      <a:schemeClr val="dk1"/>
+    </dgm:txFillClrLst>
+    <dgm:txEffectClrLst/>
+  </dgm:styleLbl>
+  <dgm:styleLbl name="solidAlignAcc1">
+    <dgm:fillClrLst meth="repeat">
+      <a:schemeClr val="lt1"/>
+    </dgm:fillClrLst>
+    <dgm:linClrLst meth="repeat">
+      <a:schemeClr val="accent1"/>
+    </dgm:linClrLst>
+    <dgm:effectClrLst/>
+    <dgm:txLinClrLst/>
+    <dgm:txFillClrLst meth="repeat">
+      <a:schemeClr val="dk1"/>
+    </dgm:txFillClrLst>
+    <dgm:txEffectClrLst/>
+  </dgm:styleLbl>
+  <dgm:styleLbl name="solidBgAcc1">
+    <dgm:fillClrLst meth="repeat">
+      <a:schemeClr val="lt1"/>
+    </dgm:fillClrLst>
+    <dgm:linClrLst meth="repeat">
+      <a:schemeClr val="accent1"/>
+    </dgm:linClrLst>
+    <dgm:effectClrLst/>
+    <dgm:txLinClrLst/>
+    <dgm:txFillClrLst meth="repeat">
+      <a:schemeClr val="dk1"/>
+    </dgm:txFillClrLst>
+    <dgm:txEffectClrLst/>
+  </dgm:styleLbl>
+  <dgm:styleLbl name="fgAccFollowNode1">
+    <dgm:fillClrLst meth="repeat">
+      <a:schemeClr val="accent1">
+        <a:alpha val="90000"/>
+        <a:tint val="40000"/>
+      </a:schemeClr>
+    </dgm:fillClrLst>
+    <dgm:linClrLst meth="repeat">
+      <a:schemeClr val="accent1">
+        <a:alpha val="90000"/>
+        <a:tint val="40000"/>
+      </a:schemeClr>
+    </dgm:linClrLst>
+    <dgm:effectClrLst/>
+    <dgm:txLinClrLst/>
+    <dgm:txFillClrLst meth="repeat">
+      <a:schemeClr val="dk1"/>
+    </dgm:txFillClrLst>
+    <dgm:txEffectClrLst/>
+  </dgm:styleLbl>
+  <dgm:styleLbl name="alignAccFollowNode1">
+    <dgm:fillClrLst meth="repeat">
+      <a:schemeClr val="accent1">
+        <a:alpha val="90000"/>
+        <a:tint val="40000"/>
+      </a:schemeClr>
+    </dgm:fillClrLst>
+    <dgm:linClrLst meth="repeat">
+      <a:schemeClr val="accent1">
+        <a:alpha val="90000"/>
+        <a:tint val="40000"/>
+      </a:schemeClr>
+    </dgm:linClrLst>
+    <dgm:effectClrLst/>
+    <dgm:txLinClrLst/>
+    <dgm:txFillClrLst meth="repeat">
+      <a:schemeClr val="dk1"/>
+    </dgm:txFillClrLst>
+    <dgm:txEffectClrLst/>
+  </dgm:styleLbl>
+  <dgm:styleLbl name="bgAccFollowNode1">
+    <dgm:fillClrLst meth="repeat">
+      <a:schemeClr val="accent1">
+        <a:alpha val="90000"/>
+        <a:tint val="40000"/>
+      </a:schemeClr>
+    </dgm:fillClrLst>
+    <dgm:linClrLst meth="repeat">
+      <a:schemeClr val="accent1">
+        <a:alpha val="90000"/>
+        <a:tint val="40000"/>
+      </a:schemeClr>
+    </dgm:linClrLst>
+    <dgm:effectClrLst/>
+    <dgm:txLinClrLst/>
+    <dgm:txFillClrLst meth="repeat">
+      <a:schemeClr val="dk1"/>
+    </dgm:txFillClrLst>
+    <dgm:txEffectClrLst/>
+  </dgm:styleLbl>
+  <dgm:styleLbl name="fgAcc0">
+    <dgm:fillClrLst meth="repeat">
+      <a:schemeClr val="lt1">
+        <a:alpha val="90000"/>
+      </a:schemeClr>
+    </dgm:fillClrLst>
+    <dgm:linClrLst meth="repeat">
+      <a:schemeClr val="accent1"/>
+    </dgm:linClrLst>
+    <dgm:effectClrLst/>
+    <dgm:txLinClrLst/>
+    <dgm:txFillClrLst meth="repeat">
+      <a:schemeClr val="dk1"/>
+    </dgm:txFillClrLst>
+    <dgm:txEffectClrLst/>
+  </dgm:styleLbl>
+  <dgm:styleLbl name="fgAcc2">
+    <dgm:fillClrLst meth="repeat">
+      <a:schemeClr val="lt1">
+        <a:alpha val="90000"/>
+      </a:schemeClr>
+    </dgm:fillClrLst>
+    <dgm:linClrLst meth="repeat">
+      <a:schemeClr val="accent1"/>
+    </dgm:linClrLst>
+    <dgm:effectClrLst/>
+    <dgm:txLinClrLst/>
+    <dgm:txFillClrLst meth="repeat">
+      <a:schemeClr val="dk1"/>
+    </dgm:txFillClrLst>
+    <dgm:txEffectClrLst/>
+  </dgm:styleLbl>
+  <dgm:styleLbl name="fgAcc3">
+    <dgm:fillClrLst meth="repeat">
+      <a:schemeClr val="lt1">
+        <a:alpha val="90000"/>
+      </a:schemeClr>
+    </dgm:fillClrLst>
+    <dgm:linClrLst meth="repeat">
+      <a:schemeClr val="accent1"/>
+    </dgm:linClrLst>
+    <dgm:effectClrLst/>
+    <dgm:txLinClrLst/>
+    <dgm:txFillClrLst meth="repeat">
+      <a:schemeClr val="dk1"/>
+    </dgm:txFillClrLst>
+    <dgm:txEffectClrLst/>
+  </dgm:styleLbl>
+  <dgm:styleLbl name="fgAcc4">
+    <dgm:fillClrLst meth="repeat">
+      <a:schemeClr val="lt1">
+        <a:alpha val="90000"/>
+      </a:schemeClr>
+    </dgm:fillClrLst>
+    <dgm:linClrLst meth="repeat">
+      <a:schemeClr val="accent1"/>
+    </dgm:linClrLst>
+    <dgm:effectClrLst/>
+    <dgm:txLinClrLst/>
+    <dgm:txFillClrLst meth="repeat">
+      <a:schemeClr val="dk1"/>
+    </dgm:txFillClrLst>
+    <dgm:txEffectClrLst/>
+  </dgm:styleLbl>
+  <dgm:styleLbl name="bgShp">
+    <dgm:fillClrLst meth="repeat">
+      <a:schemeClr val="accent1">
+        <a:tint val="40000"/>
+      </a:schemeClr>
+    </dgm:fillClrLst>
+    <dgm:linClrLst meth="repeat">
+      <a:schemeClr val="accent1"/>
+    </dgm:linClrLst>
+    <dgm:effectClrLst/>
+    <dgm:txLinClrLst/>
+    <dgm:txFillClrLst meth="repeat">
+      <a:schemeClr val="dk1"/>
+    </dgm:txFillClrLst>
+    <dgm:txEffectClrLst/>
+  </dgm:styleLbl>
+  <dgm:styleLbl name="dkBgShp">
+    <dgm:fillClrLst meth="repeat">
+      <a:schemeClr val="accent1">
+        <a:shade val="80000"/>
+      </a:schemeClr>
+    </dgm:fillClrLst>
+    <dgm:linClrLst meth="repeat">
+      <a:schemeClr val="accent1"/>
+    </dgm:linClrLst>
+    <dgm:effectClrLst/>
+    <dgm:txLinClrLst/>
+    <dgm:txFillClrLst meth="repeat">
+      <a:schemeClr val="lt1"/>
+    </dgm:txFillClrLst>
+    <dgm:txEffectClrLst/>
+  </dgm:styleLbl>
+  <dgm:styleLbl name="trBgShp">
+    <dgm:fillClrLst meth="repeat">
+      <a:schemeClr val="accent1">
+        <a:tint val="50000"/>
+        <a:alpha val="40000"/>
+      </a:schemeClr>
+    </dgm:fillClrLst>
+    <dgm:linClrLst meth="repeat">
+      <a:schemeClr val="accent1"/>
+    </dgm:linClrLst>
+    <dgm:effectClrLst/>
+    <dgm:txLinClrLst/>
+    <dgm:txFillClrLst meth="repeat">
+      <a:schemeClr val="lt1"/>
+    </dgm:txFillClrLst>
+    <dgm:txEffectClrLst/>
+  </dgm:styleLbl>
+  <dgm:styleLbl name="fgShp">
+    <dgm:fillClrLst meth="repeat">
+      <a:schemeClr val="accent1">
+        <a:tint val="60000"/>
+      </a:schemeClr>
+    </dgm:fillClrLst>
+    <dgm:linClrLst meth="repeat">
+      <a:schemeClr val="lt1"/>
+    </dgm:linClrLst>
+    <dgm:effectClrLst/>
+    <dgm:txLinClrLst/>
+    <dgm:txFillClrLst meth="repeat">
+      <a:schemeClr val="dk1"/>
+    </dgm:txFillClrLst>
+    <dgm:txEffectClrLst/>
+  </dgm:styleLbl>
+  <dgm:styleLbl name="revTx">
+    <dgm:fillClrLst meth="repeat">
+      <a:schemeClr val="lt1">
+        <a:alpha val="0"/>
+      </a:schemeClr>
+    </dgm:fillClrLst>
+    <dgm:linClrLst meth="repeat">
+      <a:schemeClr val="dk1">
+        <a:alpha val="0"/>
+      </a:schemeClr>
+    </dgm:linClrLst>
+    <dgm:effectClrLst/>
+    <dgm:txLinClrLst/>
+    <dgm:txFillClrLst meth="repeat">
+      <a:schemeClr val="tx1"/>
+    </dgm:txFillClrLst>
+    <dgm:txEffectClrLst/>
+  </dgm:styleLbl>
+</dgm:colorsDef>
+</file>
+
+<file path=ppt/diagrams/data1.xml><?xml version="1.0" encoding="utf-8"?>
+<dgm:dataModel xmlns:dgm="http://schemas.openxmlformats.org/drawingml/2006/diagram" xmlns:a="http://schemas.openxmlformats.org/drawingml/2006/main">
+  <dgm:ptLst>
+    <dgm:pt modelId="{C81D5C6D-CBE4-6F42-8309-38A48BF9648B}" type="doc">
+      <dgm:prSet loTypeId="urn:microsoft.com/office/officeart/2005/8/layout/radial4" loCatId="" qsTypeId="urn:microsoft.com/office/officeart/2005/8/quickstyle/simple4" qsCatId="simple" csTypeId="urn:microsoft.com/office/officeart/2005/8/colors/accent1_2" csCatId="accent1" phldr="1"/>
+      <dgm:spPr/>
+      <dgm:t>
+        <a:bodyPr/>
+        <a:lstStyle/>
+        <a:p>
+          <a:endParaRPr lang="de-DE"/>
+        </a:p>
+      </dgm:t>
+    </dgm:pt>
+    <dgm:pt modelId="{8FE0CD23-DE32-B64C-9C6B-915A8556AF6F}">
+      <dgm:prSet phldrT="[Text]"/>
+      <dgm:spPr/>
+      <dgm:t>
+        <a:bodyPr/>
+        <a:lstStyle/>
+        <a:p>
+          <a:r>
+            <a:rPr lang="de-DE" dirty="0" smtClean="0"/>
+            <a:t>Game</a:t>
+          </a:r>
+          <a:endParaRPr lang="de-DE" dirty="0"/>
+        </a:p>
+      </dgm:t>
+    </dgm:pt>
+    <dgm:pt modelId="{5530C059-BB2F-B045-B5E8-70468F087A17}" type="parTrans" cxnId="{9082CBE9-BACB-5048-832B-23017CA6C660}">
+      <dgm:prSet/>
+      <dgm:spPr/>
+      <dgm:t>
+        <a:bodyPr/>
+        <a:lstStyle/>
+        <a:p>
+          <a:endParaRPr lang="de-DE"/>
+        </a:p>
+      </dgm:t>
+    </dgm:pt>
+    <dgm:pt modelId="{AED983AF-3C04-1848-9930-041CC20ACC44}" type="sibTrans" cxnId="{9082CBE9-BACB-5048-832B-23017CA6C660}">
+      <dgm:prSet/>
+      <dgm:spPr/>
+      <dgm:t>
+        <a:bodyPr/>
+        <a:lstStyle/>
+        <a:p>
+          <a:endParaRPr lang="de-DE"/>
+        </a:p>
+      </dgm:t>
+    </dgm:pt>
+    <dgm:pt modelId="{3C2AC3AE-4E15-D34A-BD48-E973C38784B2}">
+      <dgm:prSet phldrT="[Text]"/>
+      <dgm:spPr/>
+      <dgm:t>
+        <a:bodyPr/>
+        <a:lstStyle/>
+        <a:p>
+          <a:r>
+            <a:rPr lang="de-DE" dirty="0" smtClean="0"/>
+            <a:t>A</a:t>
+          </a:r>
+          <a:r>
+            <a:rPr lang="en-US" dirty="0" err="1" smtClean="0"/>
+            <a:t>ssumption</a:t>
+          </a:r>
+          <a:r>
+            <a:rPr lang="en-US" dirty="0" smtClean="0"/>
+            <a:t>:</a:t>
+          </a:r>
+          <a:r>
+            <a:rPr lang="de-DE" dirty="0" smtClean="0"/>
+            <a:t>Player </a:t>
+          </a:r>
+          <a:r>
+            <a:rPr lang="de-DE" dirty="0" err="1" smtClean="0"/>
+            <a:t>can</a:t>
+          </a:r>
+          <a:r>
+            <a:rPr lang="de-DE" dirty="0" err="1" smtClean="0"/>
+            <a:t>´</a:t>
+          </a:r>
+          <a:r>
+            <a:rPr lang="de-DE" dirty="0" err="1" smtClean="0"/>
+            <a:t>t</a:t>
+          </a:r>
+          <a:r>
+            <a:rPr lang="de-DE" dirty="0" smtClean="0"/>
+            <a:t> SQL</a:t>
+          </a:r>
+          <a:endParaRPr lang="de-DE" dirty="0"/>
+        </a:p>
+      </dgm:t>
+    </dgm:pt>
+    <dgm:pt modelId="{63AE766D-E07C-9247-AFAD-8B06B9EC7C7B}" type="parTrans" cxnId="{FB5C419D-338C-CE4E-AAB6-7A8EFF0D84CD}">
+      <dgm:prSet/>
+      <dgm:spPr/>
+      <dgm:t>
+        <a:bodyPr/>
+        <a:lstStyle/>
+        <a:p>
+          <a:endParaRPr lang="de-DE"/>
+        </a:p>
+      </dgm:t>
+    </dgm:pt>
+    <dgm:pt modelId="{BA8069C5-0639-994D-8F33-14B65E4869E0}" type="sibTrans" cxnId="{FB5C419D-338C-CE4E-AAB6-7A8EFF0D84CD}">
+      <dgm:prSet/>
+      <dgm:spPr/>
+      <dgm:t>
+        <a:bodyPr/>
+        <a:lstStyle/>
+        <a:p>
+          <a:endParaRPr lang="de-DE"/>
+        </a:p>
+      </dgm:t>
+    </dgm:pt>
+    <dgm:pt modelId="{5290DF40-A8B4-284B-B19D-A7F385D1D770}">
+      <dgm:prSet phldrT="[Text]"/>
+      <dgm:spPr/>
+      <dgm:t>
+        <a:bodyPr/>
+        <a:lstStyle/>
+        <a:p>
+          <a:r>
+            <a:rPr lang="en-US" b="0" dirty="0" smtClean="0"/>
+            <a:t>Gameplay</a:t>
+          </a:r>
+          <a:r>
+            <a:rPr lang="en-US" b="1" dirty="0" smtClean="0"/>
+            <a:t> is fun</a:t>
+          </a:r>
+          <a:endParaRPr lang="de-DE" b="1" dirty="0"/>
+        </a:p>
+      </dgm:t>
+    </dgm:pt>
+    <dgm:pt modelId="{50366D02-24AE-1B4E-B39E-E27114D07EDE}" type="parTrans" cxnId="{D69FD2ED-4242-8E45-998D-1608D5E9B7E4}">
+      <dgm:prSet/>
+      <dgm:spPr/>
+      <dgm:t>
+        <a:bodyPr/>
+        <a:lstStyle/>
+        <a:p>
+          <a:endParaRPr lang="de-DE"/>
+        </a:p>
+      </dgm:t>
+    </dgm:pt>
+    <dgm:pt modelId="{FEE6F9B3-AE52-E943-8942-199AAA4B8D28}" type="sibTrans" cxnId="{D69FD2ED-4242-8E45-998D-1608D5E9B7E4}">
+      <dgm:prSet/>
+      <dgm:spPr/>
+      <dgm:t>
+        <a:bodyPr/>
+        <a:lstStyle/>
+        <a:p>
+          <a:endParaRPr lang="de-DE"/>
+        </a:p>
+      </dgm:t>
+    </dgm:pt>
+    <dgm:pt modelId="{25052E41-D85C-D34D-9436-5CE1414D603A}">
+      <dgm:prSet phldrT="[Text]"/>
+      <dgm:spPr/>
+      <dgm:t>
+        <a:bodyPr/>
+        <a:lstStyle/>
+        <a:p>
+          <a:r>
+            <a:rPr lang="de-DE" dirty="0" smtClean="0"/>
+            <a:t>Goal: Player </a:t>
+          </a:r>
+          <a:r>
+            <a:rPr lang="it-IT" dirty="0" err="1" smtClean="0"/>
+            <a:t>improves</a:t>
+          </a:r>
+          <a:r>
+            <a:rPr lang="it-IT" dirty="0" smtClean="0"/>
+            <a:t> SQL </a:t>
+          </a:r>
+          <a:r>
+            <a:rPr lang="en-US" dirty="0" smtClean="0"/>
+            <a:t>knowledge</a:t>
+          </a:r>
+          <a:endParaRPr lang="de-DE" dirty="0"/>
+        </a:p>
+      </dgm:t>
+    </dgm:pt>
+    <dgm:pt modelId="{DB39F4EC-1151-DD41-90B6-B9495A8CCEA3}" type="parTrans" cxnId="{BC1CA04F-AE57-8E45-A417-614AA5BE47E2}">
+      <dgm:prSet/>
+      <dgm:spPr/>
+      <dgm:t>
+        <a:bodyPr/>
+        <a:lstStyle/>
+        <a:p>
+          <a:endParaRPr lang="de-DE"/>
+        </a:p>
+      </dgm:t>
+    </dgm:pt>
+    <dgm:pt modelId="{310805E1-CAF3-0949-99B2-B12A2E029A1F}" type="sibTrans" cxnId="{BC1CA04F-AE57-8E45-A417-614AA5BE47E2}">
+      <dgm:prSet/>
+      <dgm:spPr/>
+      <dgm:t>
+        <a:bodyPr/>
+        <a:lstStyle/>
+        <a:p>
+          <a:endParaRPr lang="de-DE"/>
+        </a:p>
+      </dgm:t>
+    </dgm:pt>
+    <dgm:pt modelId="{28275FAB-E8F9-7240-8EA0-3D01027F43F8}" type="pres">
+      <dgm:prSet presAssocID="{C81D5C6D-CBE4-6F42-8309-38A48BF9648B}" presName="cycle" presStyleCnt="0">
+        <dgm:presLayoutVars>
+          <dgm:chMax val="1"/>
+          <dgm:dir/>
+          <dgm:animLvl val="ctr"/>
+          <dgm:resizeHandles val="exact"/>
+        </dgm:presLayoutVars>
+      </dgm:prSet>
+      <dgm:spPr/>
+    </dgm:pt>
+    <dgm:pt modelId="{6BE7EDEF-7A79-3840-9CEE-1B2C25B70CFE}" type="pres">
+      <dgm:prSet presAssocID="{8FE0CD23-DE32-B64C-9C6B-915A8556AF6F}" presName="centerShape" presStyleLbl="node0" presStyleIdx="0" presStyleCnt="1"/>
+      <dgm:spPr/>
+    </dgm:pt>
+    <dgm:pt modelId="{CF825D73-F4A9-304B-BE24-354463AF9862}" type="pres">
+      <dgm:prSet presAssocID="{63AE766D-E07C-9247-AFAD-8B06B9EC7C7B}" presName="parTrans" presStyleLbl="bgSibTrans2D1" presStyleIdx="0" presStyleCnt="3"/>
+      <dgm:spPr/>
+    </dgm:pt>
+    <dgm:pt modelId="{B587CFA2-4110-8A47-84EC-3D69A2EEF650}" type="pres">
+      <dgm:prSet presAssocID="{3C2AC3AE-4E15-D34A-BD48-E973C38784B2}" presName="node" presStyleLbl="node1" presStyleIdx="0" presStyleCnt="3" custScaleX="161299" custScaleY="103535" custRadScaleRad="149509" custRadScaleInc="-2739">
+        <dgm:presLayoutVars>
+          <dgm:bulletEnabled val="1"/>
+        </dgm:presLayoutVars>
+      </dgm:prSet>
+      <dgm:spPr/>
+      <dgm:t>
+        <a:bodyPr/>
+        <a:lstStyle/>
+        <a:p>
+          <a:endParaRPr lang="de-DE"/>
+        </a:p>
+      </dgm:t>
+    </dgm:pt>
+    <dgm:pt modelId="{23786414-4395-004A-BAB4-10A34BCB6A2A}" type="pres">
+      <dgm:prSet presAssocID="{50366D02-24AE-1B4E-B39E-E27114D07EDE}" presName="parTrans" presStyleLbl="bgSibTrans2D1" presStyleIdx="1" presStyleCnt="3"/>
+      <dgm:spPr/>
+    </dgm:pt>
+    <dgm:pt modelId="{CB115302-BA9B-4145-AF35-3A193391AF62}" type="pres">
+      <dgm:prSet presAssocID="{5290DF40-A8B4-284B-B19D-A7F385D1D770}" presName="node" presStyleLbl="node1" presStyleIdx="1" presStyleCnt="3">
+        <dgm:presLayoutVars>
+          <dgm:bulletEnabled val="1"/>
+        </dgm:presLayoutVars>
+      </dgm:prSet>
+      <dgm:spPr/>
+      <dgm:t>
+        <a:bodyPr/>
+        <a:lstStyle/>
+        <a:p>
+          <a:endParaRPr lang="de-DE"/>
+        </a:p>
+      </dgm:t>
+    </dgm:pt>
+    <dgm:pt modelId="{DDC0CF13-2C00-0645-8DBC-70114DA4ED93}" type="pres">
+      <dgm:prSet presAssocID="{DB39F4EC-1151-DD41-90B6-B9495A8CCEA3}" presName="parTrans" presStyleLbl="bgSibTrans2D1" presStyleIdx="2" presStyleCnt="3"/>
+      <dgm:spPr/>
+    </dgm:pt>
+    <dgm:pt modelId="{C100763A-31C3-2047-9F09-97BC4CF9F8CF}" type="pres">
+      <dgm:prSet presAssocID="{25052E41-D85C-D34D-9436-5CE1414D603A}" presName="node" presStyleLbl="node1" presStyleIdx="2" presStyleCnt="3" custScaleX="170458" custRadScaleRad="148583" custRadScaleInc="7452">
+        <dgm:presLayoutVars>
+          <dgm:bulletEnabled val="1"/>
+        </dgm:presLayoutVars>
+      </dgm:prSet>
+      <dgm:spPr/>
+      <dgm:t>
+        <a:bodyPr/>
+        <a:lstStyle/>
+        <a:p>
+          <a:endParaRPr lang="de-DE"/>
+        </a:p>
+      </dgm:t>
+    </dgm:pt>
+  </dgm:ptLst>
+  <dgm:cxnLst>
+    <dgm:cxn modelId="{BADDDDF2-A7A2-2D40-BECC-506A103068DA}" type="presOf" srcId="{50366D02-24AE-1B4E-B39E-E27114D07EDE}" destId="{23786414-4395-004A-BAB4-10A34BCB6A2A}" srcOrd="0" destOrd="0" presId="urn:microsoft.com/office/officeart/2005/8/layout/radial4"/>
+    <dgm:cxn modelId="{C5050F4D-8D05-8A41-929D-ACA13812EA24}" type="presOf" srcId="{8FE0CD23-DE32-B64C-9C6B-915A8556AF6F}" destId="{6BE7EDEF-7A79-3840-9CEE-1B2C25B70CFE}" srcOrd="0" destOrd="0" presId="urn:microsoft.com/office/officeart/2005/8/layout/radial4"/>
+    <dgm:cxn modelId="{230F8285-CD3D-7A48-B2DC-DA7A19EFC5E1}" type="presOf" srcId="{DB39F4EC-1151-DD41-90B6-B9495A8CCEA3}" destId="{DDC0CF13-2C00-0645-8DBC-70114DA4ED93}" srcOrd="0" destOrd="0" presId="urn:microsoft.com/office/officeart/2005/8/layout/radial4"/>
+    <dgm:cxn modelId="{17D1F755-1C8A-6841-9FD5-CCA428A58884}" type="presOf" srcId="{3C2AC3AE-4E15-D34A-BD48-E973C38784B2}" destId="{B587CFA2-4110-8A47-84EC-3D69A2EEF650}" srcOrd="0" destOrd="0" presId="urn:microsoft.com/office/officeart/2005/8/layout/radial4"/>
+    <dgm:cxn modelId="{2B9E6107-231F-AD44-9DCC-EDE050556E2F}" type="presOf" srcId="{5290DF40-A8B4-284B-B19D-A7F385D1D770}" destId="{CB115302-BA9B-4145-AF35-3A193391AF62}" srcOrd="0" destOrd="0" presId="urn:microsoft.com/office/officeart/2005/8/layout/radial4"/>
+    <dgm:cxn modelId="{9082CBE9-BACB-5048-832B-23017CA6C660}" srcId="{C81D5C6D-CBE4-6F42-8309-38A48BF9648B}" destId="{8FE0CD23-DE32-B64C-9C6B-915A8556AF6F}" srcOrd="0" destOrd="0" parTransId="{5530C059-BB2F-B045-B5E8-70468F087A17}" sibTransId="{AED983AF-3C04-1848-9930-041CC20ACC44}"/>
+    <dgm:cxn modelId="{0B8C994B-B855-4E4D-8061-61627D99CBA5}" type="presOf" srcId="{25052E41-D85C-D34D-9436-5CE1414D603A}" destId="{C100763A-31C3-2047-9F09-97BC4CF9F8CF}" srcOrd="0" destOrd="0" presId="urn:microsoft.com/office/officeart/2005/8/layout/radial4"/>
+    <dgm:cxn modelId="{FB5C419D-338C-CE4E-AAB6-7A8EFF0D84CD}" srcId="{8FE0CD23-DE32-B64C-9C6B-915A8556AF6F}" destId="{3C2AC3AE-4E15-D34A-BD48-E973C38784B2}" srcOrd="0" destOrd="0" parTransId="{63AE766D-E07C-9247-AFAD-8B06B9EC7C7B}" sibTransId="{BA8069C5-0639-994D-8F33-14B65E4869E0}"/>
+    <dgm:cxn modelId="{D69FD2ED-4242-8E45-998D-1608D5E9B7E4}" srcId="{8FE0CD23-DE32-B64C-9C6B-915A8556AF6F}" destId="{5290DF40-A8B4-284B-B19D-A7F385D1D770}" srcOrd="1" destOrd="0" parTransId="{50366D02-24AE-1B4E-B39E-E27114D07EDE}" sibTransId="{FEE6F9B3-AE52-E943-8942-199AAA4B8D28}"/>
+    <dgm:cxn modelId="{9023F378-6A9F-AA47-A44B-A9564AF8B945}" type="presOf" srcId="{63AE766D-E07C-9247-AFAD-8B06B9EC7C7B}" destId="{CF825D73-F4A9-304B-BE24-354463AF9862}" srcOrd="0" destOrd="0" presId="urn:microsoft.com/office/officeart/2005/8/layout/radial4"/>
+    <dgm:cxn modelId="{D52851B8-101E-AE47-94C2-05C5A52CDBE5}" type="presOf" srcId="{C81D5C6D-CBE4-6F42-8309-38A48BF9648B}" destId="{28275FAB-E8F9-7240-8EA0-3D01027F43F8}" srcOrd="0" destOrd="0" presId="urn:microsoft.com/office/officeart/2005/8/layout/radial4"/>
+    <dgm:cxn modelId="{BC1CA04F-AE57-8E45-A417-614AA5BE47E2}" srcId="{8FE0CD23-DE32-B64C-9C6B-915A8556AF6F}" destId="{25052E41-D85C-D34D-9436-5CE1414D603A}" srcOrd="2" destOrd="0" parTransId="{DB39F4EC-1151-DD41-90B6-B9495A8CCEA3}" sibTransId="{310805E1-CAF3-0949-99B2-B12A2E029A1F}"/>
+    <dgm:cxn modelId="{020726B6-9314-DB4D-B0F2-8BEDEB965992}" type="presParOf" srcId="{28275FAB-E8F9-7240-8EA0-3D01027F43F8}" destId="{6BE7EDEF-7A79-3840-9CEE-1B2C25B70CFE}" srcOrd="0" destOrd="0" presId="urn:microsoft.com/office/officeart/2005/8/layout/radial4"/>
+    <dgm:cxn modelId="{5F1312DD-4D94-454E-8740-58A72869A2EC}" type="presParOf" srcId="{28275FAB-E8F9-7240-8EA0-3D01027F43F8}" destId="{CF825D73-F4A9-304B-BE24-354463AF9862}" srcOrd="1" destOrd="0" presId="urn:microsoft.com/office/officeart/2005/8/layout/radial4"/>
+    <dgm:cxn modelId="{79DEAEEE-DF6A-FD4E-8702-E27D863DCE0F}" type="presParOf" srcId="{28275FAB-E8F9-7240-8EA0-3D01027F43F8}" destId="{B587CFA2-4110-8A47-84EC-3D69A2EEF650}" srcOrd="2" destOrd="0" presId="urn:microsoft.com/office/officeart/2005/8/layout/radial4"/>
+    <dgm:cxn modelId="{7DB702E1-6217-6C47-88C8-34EC844CD045}" type="presParOf" srcId="{28275FAB-E8F9-7240-8EA0-3D01027F43F8}" destId="{23786414-4395-004A-BAB4-10A34BCB6A2A}" srcOrd="3" destOrd="0" presId="urn:microsoft.com/office/officeart/2005/8/layout/radial4"/>
+    <dgm:cxn modelId="{2D387D5B-CF3E-6340-85DF-752255DBDFEC}" type="presParOf" srcId="{28275FAB-E8F9-7240-8EA0-3D01027F43F8}" destId="{CB115302-BA9B-4145-AF35-3A193391AF62}" srcOrd="4" destOrd="0" presId="urn:microsoft.com/office/officeart/2005/8/layout/radial4"/>
+    <dgm:cxn modelId="{38004BAD-3EFA-E445-A425-A7C3F1A1EE06}" type="presParOf" srcId="{28275FAB-E8F9-7240-8EA0-3D01027F43F8}" destId="{DDC0CF13-2C00-0645-8DBC-70114DA4ED93}" srcOrd="5" destOrd="0" presId="urn:microsoft.com/office/officeart/2005/8/layout/radial4"/>
+    <dgm:cxn modelId="{EE9D4A29-5234-6C42-BD5E-53B03E0DD77A}" type="presParOf" srcId="{28275FAB-E8F9-7240-8EA0-3D01027F43F8}" destId="{C100763A-31C3-2047-9F09-97BC4CF9F8CF}" srcOrd="6" destOrd="0" presId="urn:microsoft.com/office/officeart/2005/8/layout/radial4"/>
+  </dgm:cxnLst>
+  <dgm:bg/>
+  <dgm:whole/>
+  <dgm:extLst>
+    <a:ext uri="http://schemas.microsoft.com/office/drawing/2008/diagram">
+      <dsp:dataModelExt xmlns:dsp="http://schemas.microsoft.com/office/drawing/2008/diagram" relId="rId6" minVer="http://schemas.openxmlformats.org/drawingml/2006/diagram"/>
+    </a:ext>
+  </dgm:extLst>
+</dgm:dataModel>
+</file>
+
+<file path=ppt/diagrams/drawing1.xml><?xml version="1.0" encoding="utf-8"?>
+<dsp:drawing xmlns:dgm="http://schemas.openxmlformats.org/drawingml/2006/diagram" xmlns:dsp="http://schemas.microsoft.com/office/drawing/2008/diagram" xmlns:a="http://schemas.openxmlformats.org/drawingml/2006/main">
+  <dsp:spTree>
+    <dsp:nvGrpSpPr>
+      <dsp:cNvPr id="0" name=""/>
+      <dsp:cNvGrpSpPr/>
+    </dsp:nvGrpSpPr>
+    <dsp:grpSpPr/>
+    <dsp:sp modelId="{6BE7EDEF-7A79-3840-9CEE-1B2C25B70CFE}">
+      <dsp:nvSpPr>
+        <dsp:cNvPr id="0" name=""/>
+        <dsp:cNvSpPr/>
+      </dsp:nvSpPr>
+      <dsp:spPr>
+        <a:xfrm>
+          <a:off x="4211114" y="2207646"/>
+          <a:ext cx="1850921" cy="1850921"/>
+        </a:xfrm>
+        <a:prstGeom prst="ellipse">
+          <a:avLst/>
+        </a:prstGeom>
+        <a:gradFill rotWithShape="0">
+          <a:gsLst>
+            <a:gs pos="0">
+              <a:schemeClr val="accent1">
+                <a:hueOff val="0"/>
+                <a:satOff val="0"/>
+                <a:lumOff val="0"/>
+                <a:alphaOff val="0"/>
+                <a:tint val="96000"/>
+                <a:lumMod val="104000"/>
+              </a:schemeClr>
+            </a:gs>
+            <a:gs pos="100000">
+              <a:schemeClr val="accent1">
+                <a:hueOff val="0"/>
+                <a:satOff val="0"/>
+                <a:lumOff val="0"/>
+                <a:alphaOff val="0"/>
+                <a:shade val="90000"/>
+                <a:lumMod val="90000"/>
+              </a:schemeClr>
+            </a:gs>
+          </a:gsLst>
+          <a:lin ang="5400000" scaled="0"/>
+        </a:gradFill>
+        <a:ln>
+          <a:noFill/>
+        </a:ln>
+        <a:effectLst>
+          <a:outerShdw blurRad="63500" dist="25400" dir="5400000" rotWithShape="0">
+            <a:srgbClr val="000000">
+              <a:alpha val="60000"/>
+            </a:srgbClr>
+          </a:outerShdw>
+        </a:effectLst>
+      </dsp:spPr>
+      <dsp:style>
+        <a:lnRef idx="0">
+          <a:scrgbClr r="0" g="0" b="0"/>
+        </a:lnRef>
+        <a:fillRef idx="3">
+          <a:scrgbClr r="0" g="0" b="0"/>
+        </a:fillRef>
+        <a:effectRef idx="2">
+          <a:scrgbClr r="0" g="0" b="0"/>
+        </a:effectRef>
+        <a:fontRef idx="minor">
+          <a:schemeClr val="lt1"/>
+        </a:fontRef>
+      </dsp:style>
+      <dsp:txBody>
+        <a:bodyPr spcFirstLastPara="0" vert="horz" wrap="square" lIns="24130" tIns="24130" rIns="24130" bIns="24130" numCol="1" spcCol="1270" anchor="ctr" anchorCtr="0">
+          <a:noAutofit/>
+        </a:bodyPr>
+        <a:lstStyle/>
+        <a:p>
+          <a:pPr lvl="0" algn="ctr" defTabSz="1689100">
+            <a:lnSpc>
+              <a:spcPct val="90000"/>
+            </a:lnSpc>
+            <a:spcBef>
+              <a:spcPct val="0"/>
+            </a:spcBef>
+            <a:spcAft>
+              <a:spcPct val="35000"/>
+            </a:spcAft>
+          </a:pPr>
+          <a:r>
+            <a:rPr lang="de-DE" sz="3800" kern="1200" dirty="0" smtClean="0"/>
+            <a:t>Game</a:t>
+          </a:r>
+          <a:endParaRPr lang="de-DE" sz="3800" kern="1200" dirty="0"/>
+        </a:p>
+      </dsp:txBody>
+      <dsp:txXfrm>
+        <a:off x="4482175" y="2478707"/>
+        <a:ext cx="1308799" cy="1308799"/>
+      </dsp:txXfrm>
+    </dsp:sp>
+    <dsp:sp modelId="{CF825D73-F4A9-304B-BE24-354463AF9862}">
+      <dsp:nvSpPr>
+        <dsp:cNvPr id="0" name=""/>
+        <dsp:cNvSpPr/>
+      </dsp:nvSpPr>
+      <dsp:spPr>
+        <a:xfrm rot="12801396">
+          <a:off x="1892493" y="1575555"/>
+          <a:ext cx="2557400" cy="527512"/>
+        </a:xfrm>
+        <a:prstGeom prst="leftArrow">
+          <a:avLst>
+            <a:gd name="adj1" fmla="val 60000"/>
+            <a:gd name="adj2" fmla="val 50000"/>
+          </a:avLst>
+        </a:prstGeom>
+        <a:gradFill rotWithShape="0">
+          <a:gsLst>
+            <a:gs pos="0">
+              <a:schemeClr val="accent1">
+                <a:tint val="60000"/>
+                <a:hueOff val="0"/>
+                <a:satOff val="0"/>
+                <a:lumOff val="0"/>
+                <a:alphaOff val="0"/>
+                <a:tint val="96000"/>
+                <a:lumMod val="104000"/>
+              </a:schemeClr>
+            </a:gs>
+            <a:gs pos="100000">
+              <a:schemeClr val="accent1">
+                <a:tint val="60000"/>
+                <a:hueOff val="0"/>
+                <a:satOff val="0"/>
+                <a:lumOff val="0"/>
+                <a:alphaOff val="0"/>
+                <a:shade val="90000"/>
+                <a:lumMod val="90000"/>
+              </a:schemeClr>
+            </a:gs>
+          </a:gsLst>
+          <a:lin ang="5400000" scaled="0"/>
+        </a:gradFill>
+        <a:ln>
+          <a:noFill/>
+        </a:ln>
+        <a:effectLst>
+          <a:outerShdw blurRad="63500" dist="25400" dir="5400000" rotWithShape="0">
+            <a:srgbClr val="000000">
+              <a:alpha val="60000"/>
+            </a:srgbClr>
+          </a:outerShdw>
+        </a:effectLst>
+      </dsp:spPr>
+      <dsp:style>
+        <a:lnRef idx="0">
+          <a:scrgbClr r="0" g="0" b="0"/>
+        </a:lnRef>
+        <a:fillRef idx="3">
+          <a:scrgbClr r="0" g="0" b="0"/>
+        </a:fillRef>
+        <a:effectRef idx="2">
+          <a:scrgbClr r="0" g="0" b="0"/>
+        </a:effectRef>
+        <a:fontRef idx="minor">
+          <a:schemeClr val="lt1"/>
+        </a:fontRef>
+      </dsp:style>
+    </dsp:sp>
+    <dsp:sp modelId="{B587CFA2-4110-8A47-84EC-3D69A2EEF650}">
+      <dsp:nvSpPr>
+        <dsp:cNvPr id="0" name=""/>
+        <dsp:cNvSpPr/>
+      </dsp:nvSpPr>
+      <dsp:spPr>
+        <a:xfrm>
+          <a:off x="685019" y="408007"/>
+          <a:ext cx="2836242" cy="1456427"/>
+        </a:xfrm>
+        <a:prstGeom prst="roundRect">
+          <a:avLst>
+            <a:gd name="adj" fmla="val 10000"/>
+          </a:avLst>
+        </a:prstGeom>
+        <a:gradFill rotWithShape="0">
+          <a:gsLst>
+            <a:gs pos="0">
+              <a:schemeClr val="accent1">
+                <a:hueOff val="0"/>
+                <a:satOff val="0"/>
+                <a:lumOff val="0"/>
+                <a:alphaOff val="0"/>
+                <a:tint val="96000"/>
+                <a:lumMod val="104000"/>
+              </a:schemeClr>
+            </a:gs>
+            <a:gs pos="100000">
+              <a:schemeClr val="accent1">
+                <a:hueOff val="0"/>
+                <a:satOff val="0"/>
+                <a:lumOff val="0"/>
+                <a:alphaOff val="0"/>
+                <a:shade val="90000"/>
+                <a:lumMod val="90000"/>
+              </a:schemeClr>
+            </a:gs>
+          </a:gsLst>
+          <a:lin ang="5400000" scaled="0"/>
+        </a:gradFill>
+        <a:ln>
+          <a:noFill/>
+        </a:ln>
+        <a:effectLst>
+          <a:outerShdw blurRad="63500" dist="25400" dir="5400000" rotWithShape="0">
+            <a:srgbClr val="000000">
+              <a:alpha val="60000"/>
+            </a:srgbClr>
+          </a:outerShdw>
+        </a:effectLst>
+      </dsp:spPr>
+      <dsp:style>
+        <a:lnRef idx="0">
+          <a:scrgbClr r="0" g="0" b="0"/>
+        </a:lnRef>
+        <a:fillRef idx="3">
+          <a:scrgbClr r="0" g="0" b="0"/>
+        </a:fillRef>
+        <a:effectRef idx="2">
+          <a:scrgbClr r="0" g="0" b="0"/>
+        </a:effectRef>
+        <a:fontRef idx="minor">
+          <a:schemeClr val="lt1"/>
+        </a:fontRef>
+      </dsp:style>
+      <dsp:txBody>
+        <a:bodyPr spcFirstLastPara="0" vert="horz" wrap="square" lIns="47625" tIns="47625" rIns="47625" bIns="47625" numCol="1" spcCol="1270" anchor="ctr" anchorCtr="0">
+          <a:noAutofit/>
+        </a:bodyPr>
+        <a:lstStyle/>
+        <a:p>
+          <a:pPr lvl="0" algn="ctr" defTabSz="1111250">
+            <a:lnSpc>
+              <a:spcPct val="90000"/>
+            </a:lnSpc>
+            <a:spcBef>
+              <a:spcPct val="0"/>
+            </a:spcBef>
+            <a:spcAft>
+              <a:spcPct val="35000"/>
+            </a:spcAft>
+          </a:pPr>
+          <a:r>
+            <a:rPr lang="de-DE" sz="2500" kern="1200" dirty="0" smtClean="0"/>
+            <a:t>A</a:t>
+          </a:r>
+          <a:r>
+            <a:rPr lang="en-US" sz="2500" kern="1200" dirty="0" err="1" smtClean="0"/>
+            <a:t>ssumption</a:t>
+          </a:r>
+          <a:r>
+            <a:rPr lang="en-US" sz="2500" kern="1200" dirty="0" smtClean="0"/>
+            <a:t>:</a:t>
+          </a:r>
+          <a:r>
+            <a:rPr lang="de-DE" sz="2500" kern="1200" dirty="0" smtClean="0"/>
+            <a:t>Player </a:t>
+          </a:r>
+          <a:r>
+            <a:rPr lang="de-DE" sz="2500" kern="1200" dirty="0" err="1" smtClean="0"/>
+            <a:t>can</a:t>
+          </a:r>
+          <a:r>
+            <a:rPr lang="de-DE" sz="2500" kern="1200" dirty="0" err="1" smtClean="0"/>
+            <a:t>´</a:t>
+          </a:r>
+          <a:r>
+            <a:rPr lang="de-DE" sz="2500" kern="1200" dirty="0" err="1" smtClean="0"/>
+            <a:t>t</a:t>
+          </a:r>
+          <a:r>
+            <a:rPr lang="de-DE" sz="2500" kern="1200" dirty="0" smtClean="0"/>
+            <a:t> SQL</a:t>
+          </a:r>
+          <a:endParaRPr lang="de-DE" sz="2500" kern="1200" dirty="0"/>
+        </a:p>
+      </dsp:txBody>
+      <dsp:txXfrm>
+        <a:off x="727676" y="450664"/>
+        <a:ext cx="2750928" cy="1371113"/>
+      </dsp:txXfrm>
+    </dsp:sp>
+    <dsp:sp modelId="{23786414-4395-004A-BAB4-10A34BCB6A2A}">
+      <dsp:nvSpPr>
+        <dsp:cNvPr id="0" name=""/>
+        <dsp:cNvSpPr/>
+      </dsp:nvSpPr>
+      <dsp:spPr>
+        <a:xfrm rot="16200000">
+          <a:off x="4426111" y="1150726"/>
+          <a:ext cx="1420927" cy="527512"/>
+        </a:xfrm>
+        <a:prstGeom prst="leftArrow">
+          <a:avLst>
+            <a:gd name="adj1" fmla="val 60000"/>
+            <a:gd name="adj2" fmla="val 50000"/>
+          </a:avLst>
+        </a:prstGeom>
+        <a:gradFill rotWithShape="0">
+          <a:gsLst>
+            <a:gs pos="0">
+              <a:schemeClr val="accent1">
+                <a:tint val="60000"/>
+                <a:hueOff val="0"/>
+                <a:satOff val="0"/>
+                <a:lumOff val="0"/>
+                <a:alphaOff val="0"/>
+                <a:tint val="96000"/>
+                <a:lumMod val="104000"/>
+              </a:schemeClr>
+            </a:gs>
+            <a:gs pos="100000">
+              <a:schemeClr val="accent1">
+                <a:tint val="60000"/>
+                <a:hueOff val="0"/>
+                <a:satOff val="0"/>
+                <a:lumOff val="0"/>
+                <a:alphaOff val="0"/>
+                <a:shade val="90000"/>
+                <a:lumMod val="90000"/>
+              </a:schemeClr>
+            </a:gs>
+          </a:gsLst>
+          <a:lin ang="5400000" scaled="0"/>
+        </a:gradFill>
+        <a:ln>
+          <a:noFill/>
+        </a:ln>
+        <a:effectLst>
+          <a:outerShdw blurRad="63500" dist="25400" dir="5400000" rotWithShape="0">
+            <a:srgbClr val="000000">
+              <a:alpha val="60000"/>
+            </a:srgbClr>
+          </a:outerShdw>
+        </a:effectLst>
+      </dsp:spPr>
+      <dsp:style>
+        <a:lnRef idx="0">
+          <a:scrgbClr r="0" g="0" b="0"/>
+        </a:lnRef>
+        <a:fillRef idx="3">
+          <a:scrgbClr r="0" g="0" b="0"/>
+        </a:fillRef>
+        <a:effectRef idx="2">
+          <a:scrgbClr r="0" g="0" b="0"/>
+        </a:effectRef>
+        <a:fontRef idx="minor">
+          <a:schemeClr val="lt1"/>
+        </a:fontRef>
+      </dsp:style>
+    </dsp:sp>
+    <dsp:sp modelId="{CB115302-BA9B-4145-AF35-3A193391AF62}">
+      <dsp:nvSpPr>
+        <dsp:cNvPr id="0" name=""/>
+        <dsp:cNvSpPr/>
+      </dsp:nvSpPr>
+      <dsp:spPr>
+        <a:xfrm>
+          <a:off x="4257387" y="669"/>
+          <a:ext cx="1758375" cy="1406700"/>
+        </a:xfrm>
+        <a:prstGeom prst="roundRect">
+          <a:avLst>
+            <a:gd name="adj" fmla="val 10000"/>
+          </a:avLst>
+        </a:prstGeom>
+        <a:gradFill rotWithShape="0">
+          <a:gsLst>
+            <a:gs pos="0">
+              <a:schemeClr val="accent1">
+                <a:hueOff val="0"/>
+                <a:satOff val="0"/>
+                <a:lumOff val="0"/>
+                <a:alphaOff val="0"/>
+                <a:tint val="96000"/>
+                <a:lumMod val="104000"/>
+              </a:schemeClr>
+            </a:gs>
+            <a:gs pos="100000">
+              <a:schemeClr val="accent1">
+                <a:hueOff val="0"/>
+                <a:satOff val="0"/>
+                <a:lumOff val="0"/>
+                <a:alphaOff val="0"/>
+                <a:shade val="90000"/>
+                <a:lumMod val="90000"/>
+              </a:schemeClr>
+            </a:gs>
+          </a:gsLst>
+          <a:lin ang="5400000" scaled="0"/>
+        </a:gradFill>
+        <a:ln>
+          <a:noFill/>
+        </a:ln>
+        <a:effectLst>
+          <a:outerShdw blurRad="63500" dist="25400" dir="5400000" rotWithShape="0">
+            <a:srgbClr val="000000">
+              <a:alpha val="60000"/>
+            </a:srgbClr>
+          </a:outerShdw>
+        </a:effectLst>
+      </dsp:spPr>
+      <dsp:style>
+        <a:lnRef idx="0">
+          <a:scrgbClr r="0" g="0" b="0"/>
+        </a:lnRef>
+        <a:fillRef idx="3">
+          <a:scrgbClr r="0" g="0" b="0"/>
+        </a:fillRef>
+        <a:effectRef idx="2">
+          <a:scrgbClr r="0" g="0" b="0"/>
+        </a:effectRef>
+        <a:fontRef idx="minor">
+          <a:schemeClr val="lt1"/>
+        </a:fontRef>
+      </dsp:style>
+      <dsp:txBody>
+        <a:bodyPr spcFirstLastPara="0" vert="horz" wrap="square" lIns="47625" tIns="47625" rIns="47625" bIns="47625" numCol="1" spcCol="1270" anchor="ctr" anchorCtr="0">
+          <a:noAutofit/>
+        </a:bodyPr>
+        <a:lstStyle/>
+        <a:p>
+          <a:pPr lvl="0" algn="ctr" defTabSz="1111250">
+            <a:lnSpc>
+              <a:spcPct val="90000"/>
+            </a:lnSpc>
+            <a:spcBef>
+              <a:spcPct val="0"/>
+            </a:spcBef>
+            <a:spcAft>
+              <a:spcPct val="35000"/>
+            </a:spcAft>
+          </a:pPr>
+          <a:r>
+            <a:rPr lang="en-US" sz="2500" b="0" kern="1200" dirty="0" smtClean="0"/>
+            <a:t>Gameplay</a:t>
+          </a:r>
+          <a:r>
+            <a:rPr lang="en-US" sz="2500" b="1" kern="1200" dirty="0" smtClean="0"/>
+            <a:t> is fun</a:t>
+          </a:r>
+          <a:endParaRPr lang="de-DE" sz="2500" b="1" kern="1200" dirty="0"/>
+        </a:p>
+      </dsp:txBody>
+      <dsp:txXfrm>
+        <a:off x="4298588" y="41870"/>
+        <a:ext cx="1675973" cy="1324298"/>
+      </dsp:txXfrm>
+    </dsp:sp>
+    <dsp:sp modelId="{DDC0CF13-2C00-0645-8DBC-70114DA4ED93}">
+      <dsp:nvSpPr>
+        <dsp:cNvPr id="0" name=""/>
+        <dsp:cNvSpPr/>
+      </dsp:nvSpPr>
+      <dsp:spPr>
+        <a:xfrm rot="19768272">
+          <a:off x="5885099" y="1680118"/>
+          <a:ext cx="2536144" cy="527512"/>
+        </a:xfrm>
+        <a:prstGeom prst="leftArrow">
+          <a:avLst>
+            <a:gd name="adj1" fmla="val 60000"/>
+            <a:gd name="adj2" fmla="val 50000"/>
+          </a:avLst>
+        </a:prstGeom>
+        <a:gradFill rotWithShape="0">
+          <a:gsLst>
+            <a:gs pos="0">
+              <a:schemeClr val="accent1">
+                <a:tint val="60000"/>
+                <a:hueOff val="0"/>
+                <a:satOff val="0"/>
+                <a:lumOff val="0"/>
+                <a:alphaOff val="0"/>
+                <a:tint val="96000"/>
+                <a:lumMod val="104000"/>
+              </a:schemeClr>
+            </a:gs>
+            <a:gs pos="100000">
+              <a:schemeClr val="accent1">
+                <a:tint val="60000"/>
+                <a:hueOff val="0"/>
+                <a:satOff val="0"/>
+                <a:lumOff val="0"/>
+                <a:alphaOff val="0"/>
+                <a:shade val="90000"/>
+                <a:lumMod val="90000"/>
+              </a:schemeClr>
+            </a:gs>
+          </a:gsLst>
+          <a:lin ang="5400000" scaled="0"/>
+        </a:gradFill>
+        <a:ln>
+          <a:noFill/>
+        </a:ln>
+        <a:effectLst>
+          <a:outerShdw blurRad="63500" dist="25400" dir="5400000" rotWithShape="0">
+            <a:srgbClr val="000000">
+              <a:alpha val="60000"/>
+            </a:srgbClr>
+          </a:outerShdw>
+        </a:effectLst>
+      </dsp:spPr>
+      <dsp:style>
+        <a:lnRef idx="0">
+          <a:scrgbClr r="0" g="0" b="0"/>
+        </a:lnRef>
+        <a:fillRef idx="3">
+          <a:scrgbClr r="0" g="0" b="0"/>
+        </a:fillRef>
+        <a:effectRef idx="2">
+          <a:scrgbClr r="0" g="0" b="0"/>
+        </a:effectRef>
+        <a:fontRef idx="minor">
+          <a:schemeClr val="lt1"/>
+        </a:fontRef>
+      </dsp:style>
+    </dsp:sp>
+    <dsp:sp modelId="{C100763A-31C3-2047-9F09-97BC4CF9F8CF}">
+      <dsp:nvSpPr>
+        <dsp:cNvPr id="0" name=""/>
+        <dsp:cNvSpPr/>
+      </dsp:nvSpPr>
+      <dsp:spPr>
+        <a:xfrm>
+          <a:off x="6746809" y="596380"/>
+          <a:ext cx="2997291" cy="1406700"/>
+        </a:xfrm>
+        <a:prstGeom prst="roundRect">
+          <a:avLst>
+            <a:gd name="adj" fmla="val 10000"/>
+          </a:avLst>
+        </a:prstGeom>
+        <a:gradFill rotWithShape="0">
+          <a:gsLst>
+            <a:gs pos="0">
+              <a:schemeClr val="accent1">
+                <a:hueOff val="0"/>
+                <a:satOff val="0"/>
+                <a:lumOff val="0"/>
+                <a:alphaOff val="0"/>
+                <a:tint val="96000"/>
+                <a:lumMod val="104000"/>
+              </a:schemeClr>
+            </a:gs>
+            <a:gs pos="100000">
+              <a:schemeClr val="accent1">
+                <a:hueOff val="0"/>
+                <a:satOff val="0"/>
+                <a:lumOff val="0"/>
+                <a:alphaOff val="0"/>
+                <a:shade val="90000"/>
+                <a:lumMod val="90000"/>
+              </a:schemeClr>
+            </a:gs>
+          </a:gsLst>
+          <a:lin ang="5400000" scaled="0"/>
+        </a:gradFill>
+        <a:ln>
+          <a:noFill/>
+        </a:ln>
+        <a:effectLst>
+          <a:outerShdw blurRad="63500" dist="25400" dir="5400000" rotWithShape="0">
+            <a:srgbClr val="000000">
+              <a:alpha val="60000"/>
+            </a:srgbClr>
+          </a:outerShdw>
+        </a:effectLst>
+      </dsp:spPr>
+      <dsp:style>
+        <a:lnRef idx="0">
+          <a:scrgbClr r="0" g="0" b="0"/>
+        </a:lnRef>
+        <a:fillRef idx="3">
+          <a:scrgbClr r="0" g="0" b="0"/>
+        </a:fillRef>
+        <a:effectRef idx="2">
+          <a:scrgbClr r="0" g="0" b="0"/>
+        </a:effectRef>
+        <a:fontRef idx="minor">
+          <a:schemeClr val="lt1"/>
+        </a:fontRef>
+      </dsp:style>
+      <dsp:txBody>
+        <a:bodyPr spcFirstLastPara="0" vert="horz" wrap="square" lIns="47625" tIns="47625" rIns="47625" bIns="47625" numCol="1" spcCol="1270" anchor="ctr" anchorCtr="0">
+          <a:noAutofit/>
+        </a:bodyPr>
+        <a:lstStyle/>
+        <a:p>
+          <a:pPr lvl="0" algn="ctr" defTabSz="1111250">
+            <a:lnSpc>
+              <a:spcPct val="90000"/>
+            </a:lnSpc>
+            <a:spcBef>
+              <a:spcPct val="0"/>
+            </a:spcBef>
+            <a:spcAft>
+              <a:spcPct val="35000"/>
+            </a:spcAft>
+          </a:pPr>
+          <a:r>
+            <a:rPr lang="de-DE" sz="2500" kern="1200" dirty="0" smtClean="0"/>
+            <a:t>Goal: Player </a:t>
+          </a:r>
+          <a:r>
+            <a:rPr lang="it-IT" sz="2500" kern="1200" dirty="0" err="1" smtClean="0"/>
+            <a:t>improves</a:t>
+          </a:r>
+          <a:r>
+            <a:rPr lang="it-IT" sz="2500" kern="1200" dirty="0" smtClean="0"/>
+            <a:t> SQL </a:t>
+          </a:r>
+          <a:r>
+            <a:rPr lang="en-US" sz="2500" kern="1200" dirty="0" smtClean="0"/>
+            <a:t>knowledge</a:t>
+          </a:r>
+          <a:endParaRPr lang="de-DE" sz="2500" kern="1200" dirty="0"/>
+        </a:p>
+      </dsp:txBody>
+      <dsp:txXfrm>
+        <a:off x="6788010" y="637581"/>
+        <a:ext cx="2914889" cy="1324298"/>
+      </dsp:txXfrm>
+    </dsp:sp>
+  </dsp:spTree>
+</dsp:drawing>
+</file>
+
+<file path=ppt/diagrams/layout1.xml><?xml version="1.0" encoding="utf-8"?>
+<dgm:layoutDef xmlns:dgm="http://schemas.openxmlformats.org/drawingml/2006/diagram" xmlns:a="http://schemas.openxmlformats.org/drawingml/2006/main" uniqueId="urn:microsoft.com/office/officeart/2005/8/layout/radial4">
+  <dgm:title val=""/>
+  <dgm:desc val=""/>
+  <dgm:catLst>
+    <dgm:cat type="relationship" pri="19000"/>
+  </dgm:catLst>
+  <dgm:sampData>
+    <dgm:dataModel>
+      <dgm:ptLst>
+        <dgm:pt modelId="0" type="doc"/>
+        <dgm:pt modelId="1">
+          <dgm:prSet phldr="1"/>
+        </dgm:pt>
+        <dgm:pt modelId="11">
+          <dgm:prSet phldr="1"/>
+        </dgm:pt>
+        <dgm:pt modelId="12">
+          <dgm:prSet phldr="1"/>
+        </dgm:pt>
+        <dgm:pt modelId="13">
+          <dgm:prSet phldr="1"/>
+        </dgm:pt>
+      </dgm:ptLst>
+      <dgm:cxnLst>
+        <dgm:cxn modelId="2" srcId="0" destId="1" srcOrd="0" destOrd="0"/>
+        <dgm:cxn modelId="3" srcId="1" destId="11" srcOrd="0" destOrd="0"/>
+        <dgm:cxn modelId="4" srcId="1" destId="12" srcOrd="1" destOrd="0"/>
+        <dgm:cxn modelId="5" srcId="1" destId="13" srcOrd="2" destOrd="0"/>
+      </dgm:cxnLst>
+      <dgm:bg/>
+      <dgm:whole/>
+    </dgm:dataModel>
+  </dgm:sampData>
+  <dgm:styleData>
+    <dgm:dataModel>
+      <dgm:ptLst>
+        <dgm:pt modelId="0" type="doc"/>
+        <dgm:pt modelId="1"/>
+        <dgm:pt modelId="11"/>
+        <dgm:pt modelId="12"/>
+      </dgm:ptLst>
+      <dgm:cxnLst>
+        <dgm:cxn modelId="2" srcId="0" destId="1" srcOrd="0" destOrd="0"/>
+        <dgm:cxn modelId="15" srcId="1" destId="11" srcOrd="0" destOrd="0"/>
+        <dgm:cxn modelId="16" srcId="1" destId="12" srcOrd="1" destOrd="0"/>
+      </dgm:cxnLst>
+      <dgm:bg/>
+      <dgm:whole/>
+    </dgm:dataModel>
+  </dgm:styleData>
+  <dgm:clrData>
+    <dgm:dataModel>
+      <dgm:ptLst>
+        <dgm:pt modelId="0" type="doc"/>
+        <dgm:pt modelId="1"/>
+        <dgm:pt modelId="11"/>
+        <dgm:pt modelId="12"/>
+        <dgm:pt modelId="13"/>
+        <dgm:pt modelId="14"/>
+        <dgm:pt modelId="15"/>
+        <dgm:pt modelId="16"/>
+      </dgm:ptLst>
+      <dgm:cxnLst>
+        <dgm:cxn modelId="2" srcId="0" destId="1" srcOrd="0" destOrd="0"/>
+        <dgm:cxn modelId="16" srcId="1" destId="11" srcOrd="0" destOrd="0"/>
+        <dgm:cxn modelId="17" srcId="1" destId="12" srcOrd="1" destOrd="0"/>
+        <dgm:cxn modelId="18" srcId="1" destId="13" srcOrd="2" destOrd="0"/>
+        <dgm:cxn modelId="19" srcId="1" destId="14" srcOrd="3" destOrd="0"/>
+        <dgm:cxn modelId="20" srcId="1" destId="15" srcOrd="4" destOrd="0"/>
+        <dgm:cxn modelId="21" srcId="1" destId="16" srcOrd="5" destOrd="0"/>
+      </dgm:cxnLst>
+      <dgm:bg/>
+      <dgm:whole/>
+    </dgm:dataModel>
+  </dgm:clrData>
+  <dgm:layoutNode name="cycle">
+    <dgm:varLst>
+      <dgm:chMax val="1"/>
+      <dgm:dir/>
+      <dgm:animLvl val="ctr"/>
+      <dgm:resizeHandles val="exact"/>
+    </dgm:varLst>
+    <dgm:choose name="Name0">
+      <dgm:if name="Name1" func="var" arg="dir" op="equ" val="norm">
+        <dgm:choose name="Name2">
+          <dgm:if name="Name3" axis="ch ch" ptType="node node" st="1 1" cnt="1 0" func="cnt" op="lte" val="1">
+            <dgm:alg type="cycle">
+              <dgm:param type="stAng" val="0"/>
+              <dgm:param type="spanAng" val="360"/>
+              <dgm:param type="ctrShpMap" val="fNode"/>
+            </dgm:alg>
+          </dgm:if>
+          <dgm:else name="Name4">
+            <dgm:choose name="Name5">
+              <dgm:if name="Name6" axis="ch ch" ptType="node node" st="1 1" cnt="1 0" func="cnt" op="lte" val="3">
+                <dgm:alg type="cycle">
+                  <dgm:param type="stAng" val="-55"/>
+                  <dgm:param type="spanAng" val="110"/>
+                  <dgm:param type="ctrShpMap" val="fNode"/>
+                </dgm:alg>
+              </dgm:if>
+              <dgm:else name="Name7">
+                <dgm:choose name="Name8">
+                  <dgm:if name="Name9" axis="ch ch" ptType="node node" st="1 1" cnt="1 0" func="cnt" op="equ" val="4">
+                    <dgm:alg type="cycle">
+                      <dgm:param type="stAng" val="-75"/>
+                      <dgm:param type="spanAng" val="150"/>
+                      <dgm:param type="ctrShpMap" val="fNode"/>
+                    </dgm:alg>
+                  </dgm:if>
+                  <dgm:else name="Name10">
+                    <dgm:alg type="cycle">
+                      <dgm:param type="stAng" val="-90"/>
+                      <dgm:param type="spanAng" val="180"/>
+                      <dgm:param type="ctrShpMap" val="fNode"/>
+                    </dgm:alg>
+                  </dgm:else>
+                </dgm:choose>
+              </dgm:else>
+            </dgm:choose>
+          </dgm:else>
+        </dgm:choose>
+      </dgm:if>
+      <dgm:else name="Name11">
+        <dgm:choose name="Name12">
+          <dgm:if name="Name13" axis="ch ch" ptType="node node" st="1 1" cnt="1 0" func="cnt" op="lte" val="1">
+            <dgm:alg type="cycle">
+              <dgm:param type="stAng" val="0"/>
+              <dgm:param type="spanAng" val="-360"/>
+              <dgm:param type="ctrShpMap" val="fNode"/>
+            </dgm:alg>
+          </dgm:if>
+          <dgm:else name="Name14">
+            <dgm:choose name="Name15">
+              <dgm:if name="Name16" axis="ch ch" ptType="node node" st="1 1" cnt="1 0" func="cnt" op="lte" val="3">
+                <dgm:alg type="cycle">
+                  <dgm:param type="stAng" val="55"/>
+                  <dgm:param type="spanAng" val="-110"/>
+                  <dgm:param type="ctrShpMap" val="fNode"/>
+                </dgm:alg>
+              </dgm:if>
+              <dgm:else name="Name17">
+                <dgm:choose name="Name18">
+                  <dgm:if name="Name19" axis="ch ch" ptType="node node" st="1 1" cnt="1 0" func="cnt" op="equ" val="4">
+                    <dgm:alg type="cycle">
+                      <dgm:param type="stAng" val="75"/>
+                      <dgm:param type="spanAng" val="-150"/>
+                      <dgm:param type="ctrShpMap" val="fNode"/>
+                    </dgm:alg>
+                  </dgm:if>
+                  <dgm:else name="Name20">
+                    <dgm:alg type="cycle">
+                      <dgm:param type="stAng" val="90"/>
+                      <dgm:param type="spanAng" val="-180"/>
+                      <dgm:param type="ctrShpMap" val="fNode"/>
+                    </dgm:alg>
+                  </dgm:else>
+                </dgm:choose>
+              </dgm:else>
+            </dgm:choose>
+          </dgm:else>
+        </dgm:choose>
+      </dgm:else>
+    </dgm:choose>
+    <dgm:shape xmlns:r="http://schemas.openxmlformats.org/officeDocument/2006/relationships" r:blip="">
+      <dgm:adjLst/>
+    </dgm:shape>
+    <dgm:presOf/>
+    <dgm:constrLst>
+      <dgm:constr type="w" for="ch" forName="centerShape" refType="w"/>
+      <dgm:constr type="w" for="ch" forName="node" refType="w" refFor="ch" refForName="centerShape" fact="0.95"/>
+      <dgm:constr type="h" for="ch" forName="parTrans" refType="w" refFor="ch" refForName="centerShape" fact="0.285"/>
+      <dgm:constr type="sp" refType="w" refFor="ch" refForName="centerShape" op="equ" fact="0.23"/>
+      <dgm:constr type="sibSp" refType="w" refFor="ch" refForName="node" fact="0.1"/>
+      <dgm:constr type="primFontSz" for="ch" forName="node" op="equ"/>
+    </dgm:constrLst>
+    <dgm:choose name="Name21">
+      <dgm:if name="Name22" axis="ch ch" ptType="node node" st="1 1" cnt="1 0" func="cnt" op="lte" val="5">
+        <dgm:ruleLst>
+          <dgm:rule type="w" for="ch" forName="centerShape" val="NaN" fact="0.27" max="NaN"/>
+        </dgm:ruleLst>
+      </dgm:if>
+      <dgm:else name="Name23">
+        <dgm:ruleLst>
+          <dgm:rule type="w" for="ch" forName="centerShape" val="NaN" fact="0.27" max="NaN"/>
+          <dgm:rule type="w" for="ch" forName="node" val="NaN" fact="0.7" max="NaN"/>
+        </dgm:ruleLst>
+      </dgm:else>
+    </dgm:choose>
+    <dgm:forEach name="Name24" axis="ch" ptType="node" cnt="1">
+      <dgm:layoutNode name="centerShape" styleLbl="node0">
+        <dgm:alg type="tx"/>
+        <dgm:shape xmlns:r="http://schemas.openxmlformats.org/officeDocument/2006/relationships" type="ellipse" r:blip="">
+          <dgm:adjLst/>
+        </dgm:shape>
+        <dgm:presOf axis="self"/>
+        <dgm:constrLst>
+          <dgm:constr type="tMarg" refType="primFontSz" fact="0.05"/>
+          <dgm:constr type="bMarg" refType="primFontSz" fact="0.05"/>
+          <dgm:constr type="lMarg" refType="primFontSz" fact="0.05"/>
+          <dgm:constr type="rMarg" refType="primFontSz" fact="0.05"/>
+          <dgm:constr type="primFontSz" val="65"/>
+          <dgm:constr type="h" refType="w"/>
+        </dgm:constrLst>
+        <dgm:ruleLst>
+          <dgm:rule type="primFontSz" val="5" fact="NaN" max="NaN"/>
+        </dgm:ruleLst>
+      </dgm:layoutNode>
+      <dgm:forEach name="Name25" axis="ch">
+        <dgm:forEach name="Name26" axis="self" ptType="parTrans">
+          <dgm:layoutNode name="parTrans" styleLbl="bgSibTrans2D1">
+            <dgm:alg type="conn">
+              <dgm:param type="begPts" val="auto"/>
+              <dgm:param type="endPts" val="ctr"/>
+              <dgm:param type="endSty" val="noArr"/>
+              <dgm:param type="begSty" val="arr"/>
+            </dgm:alg>
+            <dgm:shape xmlns:r="http://schemas.openxmlformats.org/officeDocument/2006/relationships" type="conn" r:blip="">
+              <dgm:adjLst/>
+            </dgm:shape>
+            <dgm:presOf axis="self"/>
+            <dgm:constrLst>
+              <dgm:constr type="begPad" refType="connDist" fact="0.055"/>
+              <dgm:constr type="endPad"/>
+            </dgm:constrLst>
+            <dgm:ruleLst/>
+          </dgm:layoutNode>
+        </dgm:forEach>
+        <dgm:forEach name="Name27" axis="self" ptType="node">
+          <dgm:layoutNode name="node" styleLbl="node1">
+            <dgm:varLst>
+              <dgm:bulletEnabled val="1"/>
+            </dgm:varLst>
+            <dgm:alg type="tx"/>
+            <dgm:shape xmlns:r="http://schemas.openxmlformats.org/officeDocument/2006/relationships" type="roundRect" r:blip="">
+              <dgm:adjLst>
+                <dgm:adj idx="1" val="0.1"/>
+              </dgm:adjLst>
+            </dgm:shape>
+            <dgm:presOf axis="desOrSelf" ptType="node"/>
+            <dgm:constrLst>
+              <dgm:constr type="primFontSz" val="65"/>
+              <dgm:constr type="h" refType="w" fact="0.8"/>
+              <dgm:constr type="tMarg" refType="primFontSz" fact="0.15"/>
+              <dgm:constr type="bMarg" refType="primFontSz" fact="0.15"/>
+              <dgm:constr type="lMarg" refType="primFontSz" fact="0.15"/>
+              <dgm:constr type="rMarg" refType="primFontSz" fact="0.15"/>
+            </dgm:constrLst>
+            <dgm:ruleLst>
+              <dgm:rule type="primFontSz" val="5" fact="NaN" max="NaN"/>
+            </dgm:ruleLst>
+          </dgm:layoutNode>
+        </dgm:forEach>
+      </dgm:forEach>
+    </dgm:forEach>
+  </dgm:layoutNode>
+</dgm:layoutDef>
+</file>
+
+<file path=ppt/diagrams/quickStyle1.xml><?xml version="1.0" encoding="utf-8"?>
+<dgm:styleDef xmlns:dgm="http://schemas.openxmlformats.org/drawingml/2006/diagram" xmlns:a="http://schemas.openxmlformats.org/drawingml/2006/main" uniqueId="urn:microsoft.com/office/officeart/2005/8/quickstyle/simple4">
+  <dgm:title val=""/>
+  <dgm:desc val=""/>
+  <dgm:catLst>
+    <dgm:cat type="simple" pri="10400"/>
+  </dgm:catLst>
+  <dgm:scene3d>
+    <a:camera prst="orthographicFront"/>
+    <a:lightRig rig="threePt" dir="t"/>
+  </dgm:scene3d>
+  <dgm:styleLbl name="node0">
+    <dgm:scene3d>
+      <a:camera prst="orthographicFront"/>
+      <a:lightRig rig="threePt" dir="t"/>
+    </dgm:scene3d>
+    <dgm:sp3d/>
+    <dgm:txPr/>
+    <dgm:style>
+      <a:lnRef idx="0">
+        <a:scrgbClr r="0" g="0" b="0"/>
+      </a:lnRef>
+      <a:fillRef idx="3">
+        <a:scrgbClr r="0" g="0" b="0"/>
+      </a:fillRef>
+      <a:effectRef idx="2">
+        <a:scrgbClr r="0" g="0" b="0"/>
+      </a:effectRef>
+      <a:fontRef idx="minor">
+        <a:schemeClr val="lt1"/>
+      </a:fontRef>
+    </dgm:style>
+  </dgm:styleLbl>
+  <dgm:styleLbl name="lnNode1">
+    <dgm:scene3d>
+      <a:camera prst="orthographicFront"/>
+      <a:lightRig rig="threePt" dir="t"/>
+    </dgm:scene3d>
+    <dgm:sp3d/>
+    <dgm:txPr/>
+    <dgm:style>
+      <a:lnRef idx="1">
+        <a:scrgbClr r="0" g="0" b="0"/>
+      </a:lnRef>
+      <a:fillRef idx="3">
+        <a:scrgbClr r="0" g="0" b="0"/>
+      </a:fillRef>
+      <a:effectRef idx="2">
+        <a:scrgbClr r="0" g="0" b="0"/>
+      </a:effectRef>
+      <a:fontRef idx="minor">
+        <a:schemeClr val="lt1"/>
+      </a:fontRef>
+    </dgm:style>
+  </dgm:styleLbl>
+  <dgm:styleLbl name="vennNode1">
+    <dgm:scene3d>
+      <a:camera prst="orthographicFront"/>
+      <a:lightRig rig="threePt" dir="t"/>
+    </dgm:scene3d>
+    <dgm:sp3d/>
+    <dgm:txPr/>
+    <dgm:style>
+      <a:lnRef idx="0">
+        <a:scrgbClr r="0" g="0" b="0"/>
+      </a:lnRef>
+      <a:fillRef idx="3">
+        <a:scrgbClr r="0" g="0" b="0"/>
+      </a:fillRef>
+      <a:effectRef idx="0">
+        <a:scrgbClr r="0" g="0" b="0"/>
+      </a:effectRef>
+      <a:fontRef idx="minor">
+        <a:schemeClr val="tx1"/>
+      </a:fontRef>
+    </dgm:style>
+  </dgm:styleLbl>
+  <dgm:styleLbl name="alignNode1">
+    <dgm:scene3d>
+      <a:camera prst="orthographicFront"/>
+      <a:lightRig rig="threePt" dir="t"/>
+    </dgm:scene3d>
+    <dgm:sp3d/>
+    <dgm:txPr/>
+    <dgm:style>
+      <a:lnRef idx="1">
+        <a:scrgbClr r="0" g="0" b="0"/>
+      </a:lnRef>
+      <a:fillRef idx="3">
+        <a:scrgbClr r="0" g="0" b="0"/>
+      </a:fillRef>
+      <a:effectRef idx="2">
+        <a:scrgbClr r="0" g="0" b="0"/>
+      </a:effectRef>
+      <a:fontRef idx="minor">
+        <a:schemeClr val="lt1"/>
+      </a:fontRef>
+    </dgm:style>
+  </dgm:styleLbl>
+  <dgm:styleLbl name="node1">
+    <dgm:scene3d>
+      <a:camera prst="orthographicFront"/>
+      <a:lightRig rig="threePt" dir="t"/>
+    </dgm:scene3d>
+    <dgm:sp3d/>
+    <dgm:txPr/>
+    <dgm:style>
+      <a:lnRef idx="0">
+        <a:scrgbClr r="0" g="0" b="0"/>
+      </a:lnRef>
+      <a:fillRef idx="3">
+        <a:scrgbClr r="0" g="0" b="0"/>
+      </a:fillRef>
+      <a:effectRef idx="2">
+        <a:scrgbClr r="0" g="0" b="0"/>
+      </a:effectRef>
+      <a:fontRef idx="minor">
+        <a:schemeClr val="lt1"/>
+      </a:fontRef>
+    </dgm:style>
+  </dgm:styleLbl>
+  <dgm:styleLbl name="node2">
+    <dgm:scene3d>
+      <a:camera prst="orthographicFront"/>
+      <a:lightRig rig="threePt" dir="t"/>
+    </dgm:scene3d>
+    <dgm:sp3d/>
+    <dgm:txPr/>
+    <dgm:style>
+      <a:lnRef idx="0">
+        <a:scrgbClr r="0" g="0" b="0"/>
+      </a:lnRef>
+      <a:fillRef idx="3">
+        <a:scrgbClr r="0" g="0" b="0"/>
+      </a:fillRef>
+      <a:effectRef idx="2">
+        <a:scrgbClr r="0" g="0" b="0"/>
+      </a:effectRef>
+      <a:fontRef idx="minor">
+        <a:schemeClr val="lt1"/>
+      </a:fontRef>
+    </dgm:style>
+  </dgm:styleLbl>
+  <dgm:styleLbl name="node3">
+    <dgm:scene3d>
+      <a:camera prst="orthographicFront"/>
+      <a:lightRig rig="threePt" dir="t"/>
+    </dgm:scene3d>
+    <dgm:sp3d/>
+    <dgm:txPr/>
+    <dgm:style>
+      <a:lnRef idx="0">
+        <a:scrgbClr r="0" g="0" b="0"/>
+      </a:lnRef>
+      <a:fillRef idx="3">
+        <a:scrgbClr r="0" g="0" b="0"/>
+      </a:fillRef>
+      <a:effectRef idx="2">
+        <a:scrgbClr r="0" g="0" b="0"/>
+      </a:effectRef>
+      <a:fontRef idx="minor">
+        <a:schemeClr val="lt1"/>
+      </a:fontRef>
+    </dgm:style>
+  </dgm:styleLbl>
+  <dgm:styleLbl name="node4">
+    <dgm:scene3d>
+      <a:camera prst="orthographicFront"/>
+      <a:lightRig rig="threePt" dir="t"/>
+    </dgm:scene3d>
+    <dgm:sp3d/>
+    <dgm:txPr/>
+    <dgm:style>
+      <a:lnRef idx="0">
+        <a:scrgbClr r="0" g="0" b="0"/>
+      </a:lnRef>
+      <a:fillRef idx="3">
+        <a:scrgbClr r="0" g="0" b="0"/>
+      </a:fillRef>
+      <a:effectRef idx="2">
+        <a:scrgbClr r="0" g="0" b="0"/>
+      </a:effectRef>
+      <a:fontRef idx="minor">
+        <a:schemeClr val="lt1"/>
+      </a:fontRef>
+    </dgm:style>
+  </dgm:styleLbl>
+  <dgm:styleLbl name="fgImgPlace1">
+    <dgm:scene3d>
+      <a:camera prst="orthographicFront"/>
+      <a:lightRig rig="threePt" dir="t"/>
+    </dgm:scene3d>
+    <dgm:sp3d/>
+    <dgm:txPr/>
+    <dgm:style>
+      <a:lnRef idx="0">
+        <a:scrgbClr r="0" g="0" b="0"/>
+      </a:lnRef>
+      <a:fillRef idx="1">
+        <a:scrgbClr r="0" g="0" b="0"/>
+      </a:fillRef>
+      <a:effectRef idx="2">
+        <a:scrgbClr r="0" g="0" b="0"/>
+      </a:effectRef>
+      <a:fontRef idx="minor"/>
+    </dgm:style>
+  </dgm:styleLbl>
+  <dgm:styleLbl name="alignImgPlace1">
+    <dgm:scene3d>
+      <a:camera prst="orthographicFront"/>
+      <a:lightRig rig="threePt" dir="t"/>
+    </dgm:scene3d>
+    <dgm:sp3d/>
+    <dgm:txPr/>
+    <dgm:style>
+      <a:lnRef idx="0">
+        <a:scrgbClr r="0" g="0" b="0"/>
+      </a:lnRef>
+      <a:fillRef idx="1">
+        <a:scrgbClr r="0" g="0" b="0"/>
+      </a:fillRef>
+      <a:effectRef idx="2">
+        <a:scrgbClr r="0" g="0" b="0"/>
+      </a:effectRef>
+      <a:fontRef idx="minor"/>
+    </dgm:style>
+  </dgm:styleLbl>
+  <dgm:styleLbl name="bgImgPlace1">
+    <dgm:scene3d>
+      <a:camera prst="orthographicFront"/>
+      <a:lightRig rig="threePt" dir="t"/>
+    </dgm:scene3d>
+    <dgm:sp3d/>
+    <dgm:txPr/>
+    <dgm:style>
+      <a:lnRef idx="0">
+        <a:scrgbClr r="0" g="0" b="0"/>
+      </a:lnRef>
+      <a:fillRef idx="1">
+        <a:scrgbClr r="0" g="0" b="0"/>
+      </a:fillRef>
+      <a:effectRef idx="2">
+        <a:scrgbClr r="0" g="0" b="0"/>
+      </a:effectRef>
+      <a:fontRef idx="minor"/>
+    </dgm:style>
+  </dgm:styleLbl>
+  <dgm:styleLbl name="sibTrans2D1">
+    <dgm:scene3d>
+      <a:camera prst="orthographicFront"/>
+      <a:lightRig rig="threePt" dir="t"/>
+    </dgm:scene3d>
+    <dgm:sp3d/>
+    <dgm:txPr/>
+    <dgm:style>
+      <a:lnRef idx="0">
+        <a:scrgbClr r="0" g="0" b="0"/>
+      </a:lnRef>
+      <a:fillRef idx="3">
+        <a:scrgbClr r="0" g="0" b="0"/>
+      </a:fillRef>
+      <a:effectRef idx="2">
+        <a:scrgbClr r="0" g="0" b="0"/>
+      </a:effectRef>
+      <a:fontRef idx="minor">
+        <a:schemeClr val="lt1"/>
+      </a:fontRef>
+    </dgm:style>
+  </dgm:styleLbl>
+  <dgm:styleLbl name="fgSibTrans2D1">
+    <dgm:scene3d>
+      <a:camera prst="orthographicFront"/>
+      <a:lightRig rig="threePt" dir="t"/>
+    </dgm:scene3d>
+    <dgm:sp3d/>
+    <dgm:txPr/>
+    <dgm:style>
+      <a:lnRef idx="0">
+        <a:scrgbClr r="0" g="0" b="0"/>
+      </a:lnRef>
+      <a:fillRef idx="3">
+        <a:scrgbClr r="0" g="0" b="0"/>
+      </a:fillRef>
+      <a:effectRef idx="2">
+        <a:scrgbClr r="0" g="0" b="0"/>
+      </a:effectRef>
+      <a:fontRef idx="minor">
+        <a:schemeClr val="lt1"/>
+      </a:fontRef>
+    </dgm:style>
+  </dgm:styleLbl>
+  <dgm:styleLbl name="bgSibTrans2D1">
+    <dgm:scene3d>
+      <a:camera prst="orthographicFront"/>
+      <a:lightRig rig="threePt" dir="t"/>
+    </dgm:scene3d>
+    <dgm:sp3d/>
+    <dgm:txPr/>
+    <dgm:style>
+      <a:lnRef idx="0">
+        <a:scrgbClr r="0" g="0" b="0"/>
+      </a:lnRef>
+      <a:fillRef idx="3">
+        <a:scrgbClr r="0" g="0" b="0"/>
+      </a:fillRef>
+      <a:effectRef idx="2">
+        <a:scrgbClr r="0" g="0" b="0"/>
+      </a:effectRef>
+      <a:fontRef idx="minor">
+        <a:schemeClr val="lt1"/>
+      </a:fontRef>
+    </dgm:style>
+  </dgm:styleLbl>
+  <dgm:styleLbl name="sibTrans1D1">
+    <dgm:scene3d>
+      <a:camera prst="orthographicFront"/>
+      <a:lightRig rig="threePt" dir="t"/>
+    </dgm:scene3d>
+    <dgm:sp3d/>
+    <dgm:txPr/>
+    <dgm:style>
+      <a:lnRef idx="1">
+        <a:scrgbClr r="0" g="0" b="0"/>
+      </a:lnRef>
+      <a:fillRef idx="0">
+        <a:scrgbClr r="0" g="0" b="0"/>
+      </a:fillRef>
+      <a:effectRef idx="0">
+        <a:scrgbClr r="0" g="0" b="0"/>
+      </a:effectRef>
+      <a:fontRef idx="minor"/>
+    </dgm:style>
+  </dgm:styleLbl>
+  <dgm:styleLbl name="callout">
+    <dgm:scene3d>
+      <a:camera prst="orthographicFront"/>
+      <a:lightRig rig="threePt" dir="t"/>
+    </dgm:scene3d>
+    <dgm:sp3d/>
+    <dgm:txPr/>
+    <dgm:style>
+      <a:lnRef idx="2">
+        <a:scrgbClr r="0" g="0" b="0"/>
+      </a:lnRef>
+      <a:fillRef idx="1">
+        <a:scrgbClr r="0" g="0" b="0"/>
+      </a:fillRef>
+      <a:effectRef idx="1">
+        <a:scrgbClr r="0" g="0" b="0"/>
+      </a:effectRef>
+      <a:fontRef idx="minor"/>
+    </dgm:style>
+  </dgm:styleLbl>
+  <dgm:styleLbl name="asst0">
+    <dgm:scene3d>
+      <a:camera prst="orthographicFront"/>
+      <a:lightRig rig="threePt" dir="t"/>
+    </dgm:scene3d>
+    <dgm:sp3d/>
+    <dgm:txPr/>
+    <dgm:style>
+      <a:lnRef idx="0">
+        <a:scrgbClr r="0" g="0" b="0"/>
+      </a:lnRef>
+      <a:fillRef idx="3">
+        <a:scrgbClr r="0" g="0" b="0"/>
+      </a:fillRef>
+      <a:effectRef idx="2">
+        <a:scrgbClr r="0" g="0" b="0"/>
+      </a:effectRef>
+      <a:fontRef idx="minor">
+        <a:schemeClr val="lt1"/>
+      </a:fontRef>
+    </dgm:style>
+  </dgm:styleLbl>
+  <dgm:styleLbl name="asst1">
+    <dgm:scene3d>
+      <a:camera prst="orthographicFront"/>
+      <a:lightRig rig="threePt" dir="t"/>
+    </dgm:scene3d>
+    <dgm:sp3d/>
+    <dgm:txPr/>
+    <dgm:style>
+      <a:lnRef idx="0">
+        <a:scrgbClr r="0" g="0" b="0"/>
+      </a:lnRef>
+      <a:fillRef idx="3">
+        <a:scrgbClr r="0" g="0" b="0"/>
+      </a:fillRef>
+      <a:effectRef idx="2">
+        <a:scrgbClr r="0" g="0" b="0"/>
+      </a:effectRef>
+      <a:fontRef idx="minor">
+        <a:schemeClr val="lt1"/>
+      </a:fontRef>
+    </dgm:style>
+  </dgm:styleLbl>
+  <dgm:styleLbl name="asst2">
+    <dgm:scene3d>
+      <a:camera prst="orthographicFront"/>
+      <a:lightRig rig="threePt" dir="t"/>
+    </dgm:scene3d>
+    <dgm:sp3d/>
+    <dgm:txPr/>
+    <dgm:style>
+      <a:lnRef idx="0">
+        <a:scrgbClr r="0" g="0" b="0"/>
+      </a:lnRef>
+      <a:fillRef idx="3">
+        <a:scrgbClr r="0" g="0" b="0"/>
+      </a:fillRef>
+      <a:effectRef idx="2">
+        <a:scrgbClr r="0" g="0" b="0"/>
+      </a:effectRef>
+      <a:fontRef idx="minor">
+        <a:schemeClr val="lt1"/>
+      </a:fontRef>
+    </dgm:style>
+  </dgm:styleLbl>
+  <dgm:styleLbl name="asst3">
+    <dgm:scene3d>
+      <a:camera prst="orthographicFront"/>
+      <a:lightRig rig="threePt" dir="t"/>
+    </dgm:scene3d>
+    <dgm:sp3d/>
+    <dgm:txPr/>
+    <dgm:style>
+      <a:lnRef idx="0">
+        <a:scrgbClr r="0" g="0" b="0"/>
+      </a:lnRef>
+      <a:fillRef idx="3">
+        <a:scrgbClr r="0" g="0" b="0"/>
+      </a:fillRef>
+      <a:effectRef idx="2">
+        <a:scrgbClr r="0" g="0" b="0"/>
+      </a:effectRef>
+      <a:fontRef idx="minor">
+        <a:schemeClr val="lt1"/>
+      </a:fontRef>
+    </dgm:style>
+  </dgm:styleLbl>
+  <dgm:styleLbl name="asst4">
+    <dgm:scene3d>
+      <a:camera prst="orthographicFront"/>
+      <a:lightRig rig="threePt" dir="t"/>
+    </dgm:scene3d>
+    <dgm:sp3d/>
+    <dgm:txPr/>
+    <dgm:style>
+      <a:lnRef idx="0">
+        <a:scrgbClr r="0" g="0" b="0"/>
+      </a:lnRef>
+      <a:fillRef idx="3">
+        <a:scrgbClr r="0" g="0" b="0"/>
+      </a:fillRef>
+      <a:effectRef idx="2">
+        <a:scrgbClr r="0" g="0" b="0"/>
+      </a:effectRef>
+      <a:fontRef idx="minor">
+        <a:schemeClr val="lt1"/>
+      </a:fontRef>
+    </dgm:style>
+  </dgm:styleLbl>
+  <dgm:styleLbl name="parChTrans2D1">
+    <dgm:scene3d>
+      <a:camera prst="orthographicFront"/>
+      <a:lightRig rig="threePt" dir="t"/>
+    </dgm:scene3d>
+    <dgm:sp3d/>
+    <dgm:txPr/>
+    <dgm:style>
+      <a:lnRef idx="0">
+        <a:scrgbClr r="0" g="0" b="0"/>
+      </a:lnRef>
+      <a:fillRef idx="3">
+        <a:scrgbClr r="0" g="0" b="0"/>
+      </a:fillRef>
+      <a:effectRef idx="2">
+        <a:scrgbClr r="0" g="0" b="0"/>
+      </a:effectRef>
+      <a:fontRef idx="minor">
+        <a:schemeClr val="lt1"/>
+      </a:fontRef>
+    </dgm:style>
+  </dgm:styleLbl>
+  <dgm:styleLbl name="parChTrans2D2">
+    <dgm:scene3d>
+      <a:camera prst="orthographicFront"/>
+      <a:lightRig rig="threePt" dir="t"/>
+    </dgm:scene3d>
+    <dgm:sp3d/>
+    <dgm:txPr/>
+    <dgm:style>
+      <a:lnRef idx="0">
+        <a:scrgbClr r="0" g="0" b="0"/>
+      </a:lnRef>
+      <a:fillRef idx="3">
+        <a:scrgbClr r="0" g="0" b="0"/>
+      </a:fillRef>
+      <a:effectRef idx="2">
+        <a:scrgbClr r="0" g="0" b="0"/>
+      </a:effectRef>
+      <a:fontRef idx="minor">
+        <a:schemeClr val="lt1"/>
+      </a:fontRef>
+    </dgm:style>
+  </dgm:styleLbl>
+  <dgm:styleLbl name="parChTrans2D3">
+    <dgm:scene3d>
+      <a:camera prst="orthographicFront"/>
+      <a:lightRig rig="threePt" dir="t"/>
+    </dgm:scene3d>
+    <dgm:sp3d/>
+    <dgm:txPr/>
+    <dgm:style>
+      <a:lnRef idx="1">
+        <a:scrgbClr r="0" g="0" b="0"/>
+      </a:lnRef>
+      <a:fillRef idx="3">
+        <a:scrgbClr r="0" g="0" b="0"/>
+      </a:fillRef>
+      <a:effectRef idx="2">
+        <a:scrgbClr r="0" g="0" b="0"/>
+      </a:effectRef>
+      <a:fontRef idx="minor">
+        <a:schemeClr val="lt1"/>
+      </a:fontRef>
+    </dgm:style>
+  </dgm:styleLbl>
+  <dgm:styleLbl name="parChTrans2D4">
+    <dgm:scene3d>
+      <a:camera prst="orthographicFront"/>
+      <a:lightRig rig="threePt" dir="t"/>
+    </dgm:scene3d>
+    <dgm:sp3d/>
+    <dgm:txPr/>
+    <dgm:style>
+      <a:lnRef idx="1">
+        <a:scrgbClr r="0" g="0" b="0"/>
+      </a:lnRef>
+      <a:fillRef idx="3">
+        <a:scrgbClr r="0" g="0" b="0"/>
+      </a:fillRef>
+      <a:effectRef idx="2">
+        <a:scrgbClr r="0" g="0" b="0"/>
+      </a:effectRef>
+      <a:fontRef idx="minor">
+        <a:schemeClr val="lt1"/>
+      </a:fontRef>
+    </dgm:style>
+  </dgm:styleLbl>
+  <dgm:styleLbl name="parChTrans1D1">
+    <dgm:scene3d>
+      <a:camera prst="orthographicFront"/>
+      <a:lightRig rig="threePt" dir="t"/>
+    </dgm:scene3d>
+    <dgm:sp3d/>
+    <dgm:txPr/>
+    <dgm:style>
+      <a:lnRef idx="1">
+        <a:scrgbClr r="0" g="0" b="0"/>
+      </a:lnRef>
+      <a:fillRef idx="0">
+        <a:scrgbClr r="0" g="0" b="0"/>
+      </a:fillRef>
+      <a:effectRef idx="0">
+        <a:scrgbClr r="0" g="0" b="0"/>
+      </a:effectRef>
+      <a:fontRef idx="minor"/>
+    </dgm:style>
+  </dgm:styleLbl>
+  <dgm:styleLbl name="parChTrans1D2">
+    <dgm:scene3d>
+      <a:camera prst="orthographicFront"/>
+      <a:lightRig rig="threePt" dir="t"/>
+    </dgm:scene3d>
+    <dgm:sp3d/>
+    <dgm:txPr/>
+    <dgm:style>
+      <a:lnRef idx="1">
+        <a:scrgbClr r="0" g="0" b="0"/>
+      </a:lnRef>
+      <a:fillRef idx="0">
+        <a:scrgbClr r="0" g="0" b="0"/>
+      </a:fillRef>
+      <a:effectRef idx="0">
+        <a:scrgbClr r="0" g="0" b="0"/>
+      </a:effectRef>
+      <a:fontRef idx="minor"/>
+    </dgm:style>
+  </dgm:styleLbl>
+  <dgm:styleLbl name="parChTrans1D3">
+    <dgm:scene3d>
+      <a:camera prst="orthographicFront"/>
+      <a:lightRig rig="threePt" dir="t"/>
+    </dgm:scene3d>
+    <dgm:sp3d/>
+    <dgm:txPr/>
+    <dgm:style>
+      <a:lnRef idx="1">
+        <a:scrgbClr r="0" g="0" b="0"/>
+      </a:lnRef>
+      <a:fillRef idx="0">
+        <a:scrgbClr r="0" g="0" b="0"/>
+      </a:fillRef>
+      <a:effectRef idx="0">
+        <a:scrgbClr r="0" g="0" b="0"/>
+      </a:effectRef>
+      <a:fontRef idx="minor"/>
+    </dgm:style>
+  </dgm:styleLbl>
+  <dgm:styleLbl name="parChTrans1D4">
+    <dgm:scene3d>
+      <a:camera prst="orthographicFront"/>
+      <a:lightRig rig="threePt" dir="t"/>
+    </dgm:scene3d>
+    <dgm:sp3d/>
+    <dgm:txPr/>
+    <dgm:style>
+      <a:lnRef idx="1">
+        <a:scrgbClr r="0" g="0" b="0"/>
+      </a:lnRef>
+      <a:fillRef idx="0">
+        <a:scrgbClr r="0" g="0" b="0"/>
+      </a:fillRef>
+      <a:effectRef idx="0">
+        <a:scrgbClr r="0" g="0" b="0"/>
+      </a:effectRef>
+      <a:fontRef idx="minor"/>
+    </dgm:style>
+  </dgm:styleLbl>
+  <dgm:styleLbl name="fgAcc1">
+    <dgm:scene3d>
+      <a:camera prst="orthographicFront"/>
+      <a:lightRig rig="threePt" dir="t"/>
+    </dgm:scene3d>
+    <dgm:sp3d/>
+    <dgm:txPr/>
+    <dgm:style>
+      <a:lnRef idx="1">
+        <a:scrgbClr r="0" g="0" b="0"/>
+      </a:lnRef>
+      <a:fillRef idx="1">
+        <a:scrgbClr r="0" g="0" b="0"/>
+      </a:fillRef>
+      <a:effectRef idx="0">
+        <a:scrgbClr r="0" g="0" b="0"/>
+      </a:effectRef>
+      <a:fontRef idx="minor"/>
+    </dgm:style>
+  </dgm:styleLbl>
+  <dgm:styleLbl name="conFgAcc1">
+    <dgm:scene3d>
+      <a:camera prst="orthographicFront"/>
+      <a:lightRig rig="threePt" dir="t"/>
+    </dgm:scene3d>
+    <dgm:sp3d/>
+    <dgm:txPr/>
+    <dgm:style>
+      <a:lnRef idx="1">
+        <a:scrgbClr r="0" g="0" b="0"/>
+      </a:lnRef>
+      <a:fillRef idx="1">
+        <a:scrgbClr r="0" g="0" b="0"/>
+      </a:fillRef>
+      <a:effectRef idx="0">
+        <a:scrgbClr r="0" g="0" b="0"/>
+      </a:effectRef>
+      <a:fontRef idx="minor"/>
+    </dgm:style>
+  </dgm:styleLbl>
+  <dgm:styleLbl name="alignAcc1">
+    <dgm:scene3d>
+      <a:camera prst="orthographicFront"/>
+      <a:lightRig rig="threePt" dir="t"/>
+    </dgm:scene3d>
+    <dgm:sp3d/>
+    <dgm:txPr/>
+    <dgm:style>
+      <a:lnRef idx="1">
+        <a:scrgbClr r="0" g="0" b="0"/>
+      </a:lnRef>
+      <a:fillRef idx="1">
+        <a:scrgbClr r="0" g="0" b="0"/>
+      </a:fillRef>
+      <a:effectRef idx="0">
+        <a:scrgbClr r="0" g="0" b="0"/>
+      </a:effectRef>
+      <a:fontRef idx="minor"/>
+    </dgm:style>
+  </dgm:styleLbl>
+  <dgm:styleLbl name="trAlignAcc1">
+    <dgm:scene3d>
+      <a:camera prst="orthographicFront"/>
+      <a:lightRig rig="threePt" dir="t"/>
+    </dgm:scene3d>
+    <dgm:sp3d/>
+    <dgm:txPr/>
+    <dgm:style>
+      <a:lnRef idx="1">
+        <a:scrgbClr r="0" g="0" b="0"/>
+      </a:lnRef>
+      <a:fillRef idx="1">
+        <a:scrgbClr r="0" g="0" b="0"/>
+      </a:fillRef>
+      <a:effectRef idx="0">
+        <a:scrgbClr r="0" g="0" b="0"/>
+      </a:effectRef>
+      <a:fontRef idx="minor"/>
+    </dgm:style>
+  </dgm:styleLbl>
+  <dgm:styleLbl name="bgAcc1">
+    <dgm:scene3d>
+      <a:camera prst="orthographicFront"/>
+      <a:lightRig rig="threePt" dir="t"/>
+    </dgm:scene3d>
+    <dgm:sp3d/>
+    <dgm:txPr/>
+    <dgm:style>
+      <a:lnRef idx="1">
+        <a:scrgbClr r="0" g="0" b="0"/>
+      </a:lnRef>
+      <a:fillRef idx="1">
+        <a:scrgbClr r="0" g="0" b="0"/>
+      </a:fillRef>
+      <a:effectRef idx="0">
+        <a:scrgbClr r="0" g="0" b="0"/>
+      </a:effectRef>
+      <a:fontRef idx="minor"/>
+    </dgm:style>
+  </dgm:styleLbl>
+  <dgm:styleLbl name="solidFgAcc1">
+    <dgm:scene3d>
+      <a:camera prst="orthographicFront"/>
+      <a:lightRig rig="threePt" dir="t"/>
+    </dgm:scene3d>
+    <dgm:sp3d/>
+    <dgm:txPr/>
+    <dgm:style>
+      <a:lnRef idx="1">
+        <a:scrgbClr r="0" g="0" b="0"/>
+      </a:lnRef>
+      <a:fillRef idx="1">
+        <a:scrgbClr r="0" g="0" b="0"/>
+      </a:fillRef>
+      <a:effectRef idx="0">
+        <a:scrgbClr r="0" g="0" b="0"/>
+      </a:effectRef>
+      <a:fontRef idx="minor"/>
+    </dgm:style>
+  </dgm:styleLbl>
+  <dgm:styleLbl name="solidAlignAcc1">
+    <dgm:scene3d>
+      <a:camera prst="orthographicFront"/>
+      <a:lightRig rig="threePt" dir="t"/>
+    </dgm:scene3d>
+    <dgm:sp3d/>
+    <dgm:txPr/>
+    <dgm:style>
+      <a:lnRef idx="1">
+        <a:scrgbClr r="0" g="0" b="0"/>
+      </a:lnRef>
+      <a:fillRef idx="1">
+        <a:scrgbClr r="0" g="0" b="0"/>
+      </a:fillRef>
+      <a:effectRef idx="0">
+        <a:scrgbClr r="0" g="0" b="0"/>
+      </a:effectRef>
+      <a:fontRef idx="minor"/>
+    </dgm:style>
+  </dgm:styleLbl>
+  <dgm:styleLbl name="solidBgAcc1">
+    <dgm:scene3d>
+      <a:camera prst="orthographicFront"/>
+      <a:lightRig rig="threePt" dir="t"/>
+    </dgm:scene3d>
+    <dgm:sp3d/>
+    <dgm:txPr/>
+    <dgm:style>
+      <a:lnRef idx="1">
+        <a:scrgbClr r="0" g="0" b="0"/>
+      </a:lnRef>
+      <a:fillRef idx="1">
+        <a:scrgbClr r="0" g="0" b="0"/>
+      </a:fillRef>
+      <a:effectRef idx="0">
+        <a:scrgbClr r="0" g="0" b="0"/>
+      </a:effectRef>
+      <a:fontRef idx="minor"/>
+    </dgm:style>
+  </dgm:styleLbl>
+  <dgm:styleLbl name="fgAccFollowNode1">
+    <dgm:scene3d>
+      <a:camera prst="orthographicFront"/>
+      <a:lightRig rig="threePt" dir="t"/>
+    </dgm:scene3d>
+    <dgm:sp3d/>
+    <dgm:txPr/>
+    <dgm:style>
+      <a:lnRef idx="1">
+        <a:scrgbClr r="0" g="0" b="0"/>
+      </a:lnRef>
+      <a:fillRef idx="1">
+        <a:scrgbClr r="0" g="0" b="0"/>
+      </a:fillRef>
+      <a:effectRef idx="0">
+        <a:scrgbClr r="0" g="0" b="0"/>
+      </a:effectRef>
+      <a:fontRef idx="minor"/>
+    </dgm:style>
+  </dgm:styleLbl>
+  <dgm:styleLbl name="alignAccFollowNode1">
+    <dgm:scene3d>
+      <a:camera prst="orthographicFront"/>
+      <a:lightRig rig="threePt" dir="t"/>
+    </dgm:scene3d>
+    <dgm:sp3d/>
+    <dgm:txPr/>
+    <dgm:style>
+      <a:lnRef idx="1">
+        <a:scrgbClr r="0" g="0" b="0"/>
+      </a:lnRef>
+      <a:fillRef idx="1">
+        <a:scrgbClr r="0" g="0" b="0"/>
+      </a:fillRef>
+      <a:effectRef idx="0">
+        <a:scrgbClr r="0" g="0" b="0"/>
+      </a:effectRef>
+      <a:fontRef idx="minor"/>
+    </dgm:style>
+  </dgm:styleLbl>
+  <dgm:styleLbl name="bgAccFollowNode1">
+    <dgm:scene3d>
+      <a:camera prst="orthographicFront"/>
+      <a:lightRig rig="threePt" dir="t"/>
+    </dgm:scene3d>
+    <dgm:sp3d/>
+    <dgm:txPr/>
+    <dgm:style>
+      <a:lnRef idx="1">
+        <a:scrgbClr r="0" g="0" b="0"/>
+      </a:lnRef>
+      <a:fillRef idx="1">
+        <a:scrgbClr r="0" g="0" b="0"/>
+      </a:fillRef>
+      <a:effectRef idx="0">
+        <a:scrgbClr r="0" g="0" b="0"/>
+      </a:effectRef>
+      <a:fontRef idx="minor"/>
+    </dgm:style>
+  </dgm:styleLbl>
+  <dgm:styleLbl name="fgAcc0">
+    <dgm:scene3d>
+      <a:camera prst="orthographicFront"/>
+      <a:lightRig rig="threePt" dir="t"/>
+    </dgm:scene3d>
+    <dgm:sp3d/>
+    <dgm:txPr/>
+    <dgm:style>
+      <a:lnRef idx="1">
+        <a:scrgbClr r="0" g="0" b="0"/>
+      </a:lnRef>
+      <a:fillRef idx="1">
+        <a:scrgbClr r="0" g="0" b="0"/>
+      </a:fillRef>
+      <a:effectRef idx="0">
+        <a:scrgbClr r="0" g="0" b="0"/>
+      </a:effectRef>
+      <a:fontRef idx="minor"/>
+    </dgm:style>
+  </dgm:styleLbl>
+  <dgm:styleLbl name="fgAcc2">
+    <dgm:scene3d>
+      <a:camera prst="orthographicFront"/>
+      <a:lightRig rig="threePt" dir="t"/>
+    </dgm:scene3d>
+    <dgm:sp3d/>
+    <dgm:txPr/>
+    <dgm:style>
+      <a:lnRef idx="1">
+        <a:scrgbClr r="0" g="0" b="0"/>
+      </a:lnRef>
+      <a:fillRef idx="1">
+        <a:scrgbClr r="0" g="0" b="0"/>
+      </a:fillRef>
+      <a:effectRef idx="0">
+        <a:scrgbClr r="0" g="0" b="0"/>
+      </a:effectRef>
+      <a:fontRef idx="minor"/>
+    </dgm:style>
+  </dgm:styleLbl>
+  <dgm:styleLbl name="fgAcc3">
+    <dgm:scene3d>
+      <a:camera prst="orthographicFront"/>
+      <a:lightRig rig="threePt" dir="t"/>
+    </dgm:scene3d>
+    <dgm:sp3d/>
+    <dgm:txPr/>
+    <dgm:style>
+      <a:lnRef idx="1">
+        <a:scrgbClr r="0" g="0" b="0"/>
+      </a:lnRef>
+      <a:fillRef idx="1">
+        <a:scrgbClr r="0" g="0" b="0"/>
+      </a:fillRef>
+      <a:effectRef idx="0">
+        <a:scrgbClr r="0" g="0" b="0"/>
+      </a:effectRef>
+      <a:fontRef idx="minor"/>
+    </dgm:style>
+  </dgm:styleLbl>
+  <dgm:styleLbl name="fgAcc4">
+    <dgm:scene3d>
+      <a:camera prst="orthographicFront"/>
+      <a:lightRig rig="threePt" dir="t"/>
+    </dgm:scene3d>
+    <dgm:sp3d/>
+    <dgm:txPr/>
+    <dgm:style>
+      <a:lnRef idx="1">
+        <a:scrgbClr r="0" g="0" b="0"/>
+      </a:lnRef>
+      <a:fillRef idx="1">
+        <a:scrgbClr r="0" g="0" b="0"/>
+      </a:fillRef>
+      <a:effectRef idx="0">
+        <a:scrgbClr r="0" g="0" b="0"/>
+      </a:effectRef>
+      <a:fontRef idx="minor"/>
+    </dgm:style>
+  </dgm:styleLbl>
+  <dgm:styleLbl name="bgShp">
+    <dgm:scene3d>
+      <a:camera prst="orthographicFront"/>
+      <a:lightRig rig="threePt" dir="t"/>
+    </dgm:scene3d>
+    <dgm:sp3d/>
+    <dgm:txPr/>
+    <dgm:style>
+      <a:lnRef idx="0">
+        <a:scrgbClr r="0" g="0" b="0"/>
+      </a:lnRef>
+      <a:fillRef idx="1">
+        <a:scrgbClr r="0" g="0" b="0"/>
+      </a:fillRef>
+      <a:effectRef idx="2">
+        <a:scrgbClr r="0" g="0" b="0"/>
+      </a:effectRef>
+      <a:fontRef idx="minor"/>
+    </dgm:style>
+  </dgm:styleLbl>
+  <dgm:styleLbl name="dkBgShp">
+    <dgm:scene3d>
+      <a:camera prst="orthographicFront"/>
+      <a:lightRig rig="threePt" dir="t"/>
+    </dgm:scene3d>
+    <dgm:sp3d/>
+    <dgm:txPr/>
+    <dgm:style>
+      <a:lnRef idx="0">
+        <a:scrgbClr r="0" g="0" b="0"/>
+      </a:lnRef>
+      <a:fillRef idx="1">
+        <a:scrgbClr r="0" g="0" b="0"/>
+      </a:fillRef>
+      <a:effectRef idx="2">
+        <a:scrgbClr r="0" g="0" b="0"/>
+      </a:effectRef>
+      <a:fontRef idx="minor"/>
+    </dgm:style>
+  </dgm:styleLbl>
+  <dgm:styleLbl name="trBgShp">
+    <dgm:scene3d>
+      <a:camera prst="orthographicFront"/>
+      <a:lightRig rig="threePt" dir="t"/>
+    </dgm:scene3d>
+    <dgm:sp3d/>
+    <dgm:txPr/>
+    <dgm:style>
+      <a:lnRef idx="0">
+        <a:scrgbClr r="0" g="0" b="0"/>
+      </a:lnRef>
+      <a:fillRef idx="1">
+        <a:scrgbClr r="0" g="0" b="0"/>
+      </a:fillRef>
+      <a:effectRef idx="0">
+        <a:scrgbClr r="0" g="0" b="0"/>
+      </a:effectRef>
+      <a:fontRef idx="minor"/>
+    </dgm:style>
+  </dgm:styleLbl>
+  <dgm:styleLbl name="fgShp">
+    <dgm:scene3d>
+      <a:camera prst="orthographicFront"/>
+      <a:lightRig rig="threePt" dir="t"/>
+    </dgm:scene3d>
+    <dgm:sp3d/>
+    <dgm:txPr/>
+    <dgm:style>
+      <a:lnRef idx="0">
+        <a:scrgbClr r="0" g="0" b="0"/>
+      </a:lnRef>
+      <a:fillRef idx="3">
+        <a:scrgbClr r="0" g="0" b="0"/>
+      </a:fillRef>
+      <a:effectRef idx="2">
+        <a:scrgbClr r="0" g="0" b="0"/>
+      </a:effectRef>
+      <a:fontRef idx="minor"/>
+    </dgm:style>
+  </dgm:styleLbl>
+  <dgm:styleLbl name="revTx">
+    <dgm:scene3d>
+      <a:camera prst="orthographicFront"/>
+      <a:lightRig rig="threePt" dir="t"/>
+    </dgm:scene3d>
+    <dgm:sp3d/>
+    <dgm:txPr/>
+    <dgm:style>
+      <a:lnRef idx="0">
+        <a:scrgbClr r="0" g="0" b="0"/>
+      </a:lnRef>
+      <a:fillRef idx="0">
+        <a:scrgbClr r="0" g="0" b="0"/>
+      </a:fillRef>
+      <a:effectRef idx="0">
+        <a:scrgbClr r="0" g="0" b="0"/>
+      </a:effectRef>
+      <a:fontRef idx="minor"/>
+    </dgm:style>
+  </dgm:styleLbl>
+</dgm:styleDef>
+</file>
+
 <file path=ppt/slideLayouts/slideLayout1.xml><?xml version="1.0" encoding="utf-8"?>
 <p:sldLayout xmlns:a="http://schemas.openxmlformats.org/drawingml/2006/main" xmlns:r="http://schemas.openxmlformats.org/officeDocument/2006/relationships" xmlns:p="http://schemas.openxmlformats.org/presentationml/2006/main" type="title" preserve="1">
   <p:cSld name="Title Slide">
@@ -301,7 +3289,7 @@
             <a:fld id="{8E36636D-D922-432D-A958-524484B5923D}" type="datetimeFigureOut">
               <a:rPr lang="en-US" dirty="0"/>
               <a:pPr/>
-              <a:t>12/6/2013</a:t>
+              <a:t>07.12.13</a:t>
             </a:fld>
             <a:endParaRPr lang="en-US" dirty="0"/>
           </a:p>
@@ -344,7 +3332,7 @@
             <a:fld id="{DF28FB93-0A08-4E7D-8E63-9EFA29F1E093}" type="slidenum">
               <a:rPr lang="en-US" dirty="0"/>
               <a:pPr/>
-              <a:t>‹#›</a:t>
+              <a:t>‹Nr.›</a:t>
             </a:fld>
             <a:endParaRPr lang="en-US" dirty="0"/>
           </a:p>
@@ -595,7 +3583,7 @@
           <a:p>
             <a:fld id="{48A87A34-81AB-432B-8DAE-1953F412C126}" type="datetimeFigureOut">
               <a:rPr lang="en-US" dirty="0"/>
-              <a:t>12/6/2013</a:t>
+              <a:t>07.12.13</a:t>
             </a:fld>
             <a:endParaRPr lang="en-US" dirty="0"/>
           </a:p>
@@ -637,7 +3625,7 @@
           <a:p>
             <a:fld id="{6D22F896-40B5-4ADD-8801-0D06FADFA095}" type="slidenum">
               <a:rPr lang="en-US" dirty="0"/>
-              <a:t>‹#›</a:t>
+              <a:t>‹Nr.›</a:t>
             </a:fld>
             <a:endParaRPr lang="en-US" dirty="0"/>
           </a:p>
@@ -782,7 +3770,7 @@
           <a:p>
             <a:fld id="{48A87A34-81AB-432B-8DAE-1953F412C126}" type="datetimeFigureOut">
               <a:rPr lang="en-US" dirty="0"/>
-              <a:t>12/6/2013</a:t>
+              <a:t>07.12.13</a:t>
             </a:fld>
             <a:endParaRPr lang="en-US" dirty="0"/>
           </a:p>
@@ -824,7 +3812,7 @@
           <a:p>
             <a:fld id="{6D22F896-40B5-4ADD-8801-0D06FADFA095}" type="slidenum">
               <a:rPr lang="en-US" dirty="0"/>
-              <a:t>‹#›</a:t>
+              <a:t>‹Nr.›</a:t>
             </a:fld>
             <a:endParaRPr lang="en-US" dirty="0"/>
           </a:p>
@@ -1038,7 +4026,7 @@
           <a:p>
             <a:fld id="{48A87A34-81AB-432B-8DAE-1953F412C126}" type="datetimeFigureOut">
               <a:rPr lang="en-US" dirty="0"/>
-              <a:t>12/6/2013</a:t>
+              <a:t>07.12.13</a:t>
             </a:fld>
             <a:endParaRPr lang="en-US" dirty="0"/>
           </a:p>
@@ -1080,7 +4068,7 @@
           <a:p>
             <a:fld id="{6D22F896-40B5-4ADD-8801-0D06FADFA095}" type="slidenum">
               <a:rPr lang="en-US" dirty="0"/>
-              <a:t>‹#›</a:t>
+              <a:t>‹Nr.›</a:t>
             </a:fld>
             <a:endParaRPr lang="en-US" dirty="0"/>
           </a:p>
@@ -1457,7 +4445,7 @@
           <a:p>
             <a:fld id="{48A87A34-81AB-432B-8DAE-1953F412C126}" type="datetimeFigureOut">
               <a:rPr lang="en-US" dirty="0"/>
-              <a:t>12/6/2013</a:t>
+              <a:t>07.12.13</a:t>
             </a:fld>
             <a:endParaRPr lang="en-US" dirty="0"/>
           </a:p>
@@ -1499,7 +4487,7 @@
           <a:p>
             <a:fld id="{6D22F896-40B5-4ADD-8801-0D06FADFA095}" type="slidenum">
               <a:rPr lang="en-US" dirty="0"/>
-              <a:t>‹#›</a:t>
+              <a:t>‹Nr.›</a:t>
             </a:fld>
             <a:endParaRPr lang="en-US" dirty="0"/>
           </a:p>
@@ -1989,7 +4977,7 @@
           <a:p>
             <a:fld id="{48A87A34-81AB-432B-8DAE-1953F412C126}" type="datetimeFigureOut">
               <a:rPr lang="en-US" dirty="0"/>
-              <a:t>12/6/2013</a:t>
+              <a:t>07.12.13</a:t>
             </a:fld>
             <a:endParaRPr lang="en-US" dirty="0"/>
           </a:p>
@@ -2031,7 +5019,7 @@
           <a:p>
             <a:fld id="{6D22F896-40B5-4ADD-8801-0D06FADFA095}" type="slidenum">
               <a:rPr lang="en-US" dirty="0"/>
-              <a:t>‹#›</a:t>
+              <a:t>‹Nr.›</a:t>
             </a:fld>
             <a:endParaRPr lang="en-US" dirty="0"/>
           </a:p>
@@ -2848,7 +5836,7 @@
           <a:p>
             <a:fld id="{48A87A34-81AB-432B-8DAE-1953F412C126}" type="datetimeFigureOut">
               <a:rPr lang="en-US" dirty="0"/>
-              <a:t>12/6/2013</a:t>
+              <a:t>07.12.13</a:t>
             </a:fld>
             <a:endParaRPr lang="en-US" dirty="0"/>
           </a:p>
@@ -2890,7 +5878,7 @@
           <a:p>
             <a:fld id="{6D22F896-40B5-4ADD-8801-0D06FADFA095}" type="slidenum">
               <a:rPr lang="en-US" dirty="0"/>
-              <a:t>‹#›</a:t>
+              <a:t>‹Nr.›</a:t>
             </a:fld>
             <a:endParaRPr lang="en-US" dirty="0"/>
           </a:p>
@@ -3014,7 +6002,7 @@
             <a:fld id="{8E36636D-D922-432D-A958-524484B5923D}" type="datetimeFigureOut">
               <a:rPr lang="en-US" dirty="0"/>
               <a:pPr/>
-              <a:t>12/6/2013</a:t>
+              <a:t>07.12.13</a:t>
             </a:fld>
             <a:endParaRPr lang="en-US" dirty="0"/>
           </a:p>
@@ -3057,7 +6045,7 @@
             <a:fld id="{DF28FB93-0A08-4E7D-8E63-9EFA29F1E093}" type="slidenum">
               <a:rPr lang="en-US" dirty="0"/>
               <a:pPr/>
-              <a:t>‹#›</a:t>
+              <a:t>‹Nr.›</a:t>
             </a:fld>
             <a:endParaRPr lang="en-US" dirty="0"/>
           </a:p>
@@ -3195,7 +6183,7 @@
             <a:fld id="{8E36636D-D922-432D-A958-524484B5923D}" type="datetimeFigureOut">
               <a:rPr lang="en-US" dirty="0"/>
               <a:pPr/>
-              <a:t>12/6/2013</a:t>
+              <a:t>07.12.13</a:t>
             </a:fld>
             <a:endParaRPr lang="en-US" dirty="0"/>
           </a:p>
@@ -3238,7 +6226,7 @@
             <a:fld id="{DF28FB93-0A08-4E7D-8E63-9EFA29F1E093}" type="slidenum">
               <a:rPr lang="en-US" dirty="0"/>
               <a:pPr/>
-              <a:t>‹#›</a:t>
+              <a:t>‹Nr.›</a:t>
             </a:fld>
             <a:endParaRPr lang="en-US" dirty="0"/>
           </a:p>
@@ -3362,7 +6350,7 @@
             <a:fld id="{8E36636D-D922-432D-A958-524484B5923D}" type="datetimeFigureOut">
               <a:rPr lang="en-US" dirty="0"/>
               <a:pPr/>
-              <a:t>12/6/2013</a:t>
+              <a:t>07.12.13</a:t>
             </a:fld>
             <a:endParaRPr lang="en-US" dirty="0"/>
           </a:p>
@@ -3405,7 +6393,7 @@
             <a:fld id="{DF28FB93-0A08-4E7D-8E63-9EFA29F1E093}" type="slidenum">
               <a:rPr lang="en-US" dirty="0"/>
               <a:pPr/>
-              <a:t>‹#›</a:t>
+              <a:t>‹Nr.›</a:t>
             </a:fld>
             <a:endParaRPr lang="en-US" dirty="0"/>
           </a:p>
@@ -3603,7 +6591,7 @@
             <a:fld id="{8E36636D-D922-432D-A958-524484B5923D}" type="datetimeFigureOut">
               <a:rPr lang="en-US" dirty="0"/>
               <a:pPr/>
-              <a:t>12/6/2013</a:t>
+              <a:t>07.12.13</a:t>
             </a:fld>
             <a:endParaRPr lang="en-US" dirty="0"/>
           </a:p>
@@ -3646,7 +6634,7 @@
             <a:fld id="{DF28FB93-0A08-4E7D-8E63-9EFA29F1E093}" type="slidenum">
               <a:rPr lang="en-US" dirty="0"/>
               <a:pPr/>
-              <a:t>‹#›</a:t>
+              <a:t>‹Nr.›</a:t>
             </a:fld>
             <a:endParaRPr lang="en-US" dirty="0"/>
           </a:p>
@@ -3836,7 +6824,7 @@
             <a:fld id="{8E36636D-D922-432D-A958-524484B5923D}" type="datetimeFigureOut">
               <a:rPr lang="en-US" dirty="0"/>
               <a:pPr/>
-              <a:t>12/6/2013</a:t>
+              <a:t>07.12.13</a:t>
             </a:fld>
             <a:endParaRPr lang="en-US" dirty="0"/>
           </a:p>
@@ -3879,7 +6867,7 @@
             <a:fld id="{DF28FB93-0A08-4E7D-8E63-9EFA29F1E093}" type="slidenum">
               <a:rPr lang="en-US" dirty="0"/>
               <a:pPr/>
-              <a:t>‹#›</a:t>
+              <a:t>‹Nr.›</a:t>
             </a:fld>
             <a:endParaRPr lang="en-US" dirty="0"/>
           </a:p>
@@ -4299,7 +7287,7 @@
             <a:fld id="{8E36636D-D922-432D-A958-524484B5923D}" type="datetimeFigureOut">
               <a:rPr lang="en-US" dirty="0"/>
               <a:pPr/>
-              <a:t>12/6/2013</a:t>
+              <a:t>07.12.13</a:t>
             </a:fld>
             <a:endParaRPr lang="en-US" dirty="0"/>
           </a:p>
@@ -4342,7 +7330,7 @@
             <a:fld id="{DF28FB93-0A08-4E7D-8E63-9EFA29F1E093}" type="slidenum">
               <a:rPr lang="en-US" dirty="0"/>
               <a:pPr/>
-              <a:t>‹#›</a:t>
+              <a:t>‹Nr.›</a:t>
             </a:fld>
             <a:endParaRPr lang="en-US" dirty="0"/>
           </a:p>
@@ -4414,7 +7402,7 @@
             <a:fld id="{8E36636D-D922-432D-A958-524484B5923D}" type="datetimeFigureOut">
               <a:rPr lang="en-US" dirty="0"/>
               <a:pPr/>
-              <a:t>12/6/2013</a:t>
+              <a:t>07.12.13</a:t>
             </a:fld>
             <a:endParaRPr lang="en-US" dirty="0"/>
           </a:p>
@@ -4457,7 +7445,7 @@
             <a:fld id="{DF28FB93-0A08-4E7D-8E63-9EFA29F1E093}" type="slidenum">
               <a:rPr lang="en-US" dirty="0"/>
               <a:pPr/>
-              <a:t>‹#›</a:t>
+              <a:t>‹Nr.›</a:t>
             </a:fld>
             <a:endParaRPr lang="en-US" dirty="0"/>
           </a:p>
@@ -4506,7 +7494,7 @@
             <a:fld id="{8E36636D-D922-432D-A958-524484B5923D}" type="datetimeFigureOut">
               <a:rPr lang="en-US" dirty="0"/>
               <a:pPr/>
-              <a:t>12/6/2013</a:t>
+              <a:t>07.12.13</a:t>
             </a:fld>
             <a:endParaRPr lang="en-US" dirty="0"/>
           </a:p>
@@ -4549,7 +7537,7 @@
             <a:fld id="{DF28FB93-0A08-4E7D-8E63-9EFA29F1E093}" type="slidenum">
               <a:rPr lang="en-US" dirty="0"/>
               <a:pPr/>
-              <a:t>‹#›</a:t>
+              <a:t>‹Nr.›</a:t>
             </a:fld>
             <a:endParaRPr lang="en-US" dirty="0"/>
           </a:p>
@@ -4758,7 +7746,7 @@
             <a:fld id="{8E36636D-D922-432D-A958-524484B5923D}" type="datetimeFigureOut">
               <a:rPr lang="en-US" dirty="0"/>
               <a:pPr/>
-              <a:t>12/6/2013</a:t>
+              <a:t>07.12.13</a:t>
             </a:fld>
             <a:endParaRPr lang="en-US" dirty="0"/>
           </a:p>
@@ -4801,7 +7789,7 @@
             <a:fld id="{DF28FB93-0A08-4E7D-8E63-9EFA29F1E093}" type="slidenum">
               <a:rPr lang="en-US" dirty="0"/>
               <a:pPr/>
-              <a:t>‹#›</a:t>
+              <a:t>‹Nr.›</a:t>
             </a:fld>
             <a:endParaRPr lang="en-US" dirty="0"/>
           </a:p>
@@ -5055,7 +8043,7 @@
             <a:fld id="{8E36636D-D922-432D-A958-524484B5923D}" type="datetimeFigureOut">
               <a:rPr lang="en-US" dirty="0"/>
               <a:pPr/>
-              <a:t>12/6/2013</a:t>
+              <a:t>07.12.13</a:t>
             </a:fld>
             <a:endParaRPr lang="en-US" dirty="0"/>
           </a:p>
@@ -5098,7 +8086,7 @@
             <a:fld id="{DF28FB93-0A08-4E7D-8E63-9EFA29F1E093}" type="slidenum">
               <a:rPr lang="en-US" dirty="0"/>
               <a:pPr/>
-              <a:t>‹#›</a:t>
+              <a:t>‹Nr.›</a:t>
             </a:fld>
             <a:endParaRPr lang="en-US" dirty="0"/>
           </a:p>
@@ -5286,7 +8274,7 @@
             <a:fld id="{8E36636D-D922-432D-A958-524484B5923D}" type="datetimeFigureOut">
               <a:rPr lang="en-US" dirty="0"/>
               <a:pPr/>
-              <a:t>12/6/2013</a:t>
+              <a:t>07.12.13</a:t>
             </a:fld>
             <a:endParaRPr lang="en-US" dirty="0"/>
           </a:p>
@@ -5379,7 +8367,7 @@
             <a:fld id="{DF28FB93-0A08-4E7D-8E63-9EFA29F1E093}" type="slidenum">
               <a:rPr lang="en-US" dirty="0"/>
               <a:pPr/>
-              <a:t>‹#›</a:t>
+              <a:t>‹Nr.›</a:t>
             </a:fld>
             <a:endParaRPr lang="en-US" dirty="0"/>
           </a:p>
@@ -6042,43 +9030,197 @@
       </p:grpSpPr>
       <p:sp>
         <p:nvSpPr>
-          <p:cNvPr id="2" name="Title 1"/>
-          <p:cNvSpPr>
-            <a:spLocks noGrp="1"/>
-          </p:cNvSpPr>
-          <p:nvPr>
-            <p:ph type="title"/>
-          </p:nvPr>
-        </p:nvSpPr>
-        <p:spPr/>
-        <p:txBody>
-          <a:bodyPr/>
+          <p:cNvPr id="5" name="Pfeil nach rechts 4"/>
+          <p:cNvSpPr/>
+          <p:nvPr/>
+        </p:nvSpPr>
+        <p:spPr>
+          <a:xfrm>
+            <a:off x="5281053" y="1609580"/>
+            <a:ext cx="1911238" cy="1395807"/>
+          </a:xfrm>
+          <a:prstGeom prst="rightArrow">
+            <a:avLst/>
+          </a:prstGeom>
+        </p:spPr>
+        <p:style>
+          <a:lnRef idx="1">
+            <a:schemeClr val="accent1"/>
+          </a:lnRef>
+          <a:fillRef idx="3">
+            <a:schemeClr val="accent1"/>
+          </a:fillRef>
+          <a:effectRef idx="2">
+            <a:schemeClr val="accent1"/>
+          </a:effectRef>
+          <a:fontRef idx="minor">
+            <a:schemeClr val="lt1"/>
+          </a:fontRef>
+        </p:style>
+        <p:txBody>
+          <a:bodyPr rtlCol="0" anchor="ctr"/>
           <a:lstStyle/>
           <a:p>
-            <a:r>
-              <a:rPr lang="en-US" dirty="0" smtClean="0"/>
-              <a:t>Introduction</a:t>
-            </a:r>
-            <a:endParaRPr lang="de-DE" dirty="0"/>
-          </a:p>
-        </p:txBody>
-      </p:sp>
-      <p:sp>
-        <p:nvSpPr>
-          <p:cNvPr id="3" name="Content Placeholder 2"/>
-          <p:cNvSpPr>
-            <a:spLocks noGrp="1"/>
-          </p:cNvSpPr>
-          <p:nvPr>
-            <p:ph idx="1"/>
-          </p:nvPr>
-        </p:nvSpPr>
-        <p:spPr/>
-        <p:txBody>
-          <a:bodyPr/>
+            <a:pPr algn="ctr"/>
+            <a:endParaRPr lang="de-DE"/>
+          </a:p>
+        </p:txBody>
+      </p:sp>
+      <p:pic>
+        <p:nvPicPr>
+          <p:cNvPr id="7" name="Bild 6" descr="0357-1-03_wand-design_guenstig_acrylglasbild_muenzen.jpg"/>
+          <p:cNvPicPr>
+            <a:picLocks noChangeAspect="1"/>
+          </p:cNvPicPr>
+          <p:nvPr/>
+        </p:nvPicPr>
+        <p:blipFill>
+          <a:blip r:embed="rId2">
+            <a:extLst>
+              <a:ext uri="{28A0092B-C50C-407E-A947-70E740481C1C}">
+                <a14:useLocalDpi xmlns:a14="http://schemas.microsoft.com/office/drawing/2010/main" val="0"/>
+              </a:ext>
+            </a:extLst>
+          </a:blip>
+          <a:stretch>
+            <a:fillRect/>
+          </a:stretch>
+        </p:blipFill>
+        <p:spPr>
+          <a:xfrm>
+            <a:off x="474690" y="968262"/>
+            <a:ext cx="4338318" cy="2892212"/>
+          </a:xfrm>
+          <a:prstGeom prst="rect">
+            <a:avLst/>
+          </a:prstGeom>
+        </p:spPr>
+      </p:pic>
+      <p:pic>
+        <p:nvPicPr>
+          <p:cNvPr id="9" name="Bild 8" descr="gkzb330-gerade.jpg"/>
+          <p:cNvPicPr>
+            <a:picLocks noChangeAspect="1"/>
+          </p:cNvPicPr>
+          <p:nvPr/>
+        </p:nvPicPr>
+        <p:blipFill>
+          <a:blip r:embed="rId3">
+            <a:extLst>
+              <a:ext uri="{28A0092B-C50C-407E-A947-70E740481C1C}">
+                <a14:useLocalDpi xmlns:a14="http://schemas.microsoft.com/office/drawing/2010/main" val="0"/>
+              </a:ext>
+            </a:extLst>
+          </a:blip>
+          <a:stretch>
+            <a:fillRect/>
+          </a:stretch>
+        </p:blipFill>
+        <p:spPr>
+          <a:xfrm>
+            <a:off x="7607228" y="980839"/>
+            <a:ext cx="4111330" cy="2917362"/>
+          </a:xfrm>
+          <a:prstGeom prst="rect">
+            <a:avLst/>
+          </a:prstGeom>
+        </p:spPr>
+      </p:pic>
+      <p:sp>
+        <p:nvSpPr>
+          <p:cNvPr id="10" name="Textfeld 9"/>
+          <p:cNvSpPr txBox="1"/>
+          <p:nvPr/>
+        </p:nvSpPr>
+        <p:spPr>
+          <a:xfrm>
+            <a:off x="452661" y="5117957"/>
+            <a:ext cx="5721140" cy="584776"/>
+          </a:xfrm>
+          <a:prstGeom prst="rect">
+            <a:avLst/>
+          </a:prstGeom>
+          <a:noFill/>
+        </p:spPr>
+        <p:txBody>
+          <a:bodyPr wrap="square" rtlCol="0">
+            <a:spAutoFit/>
+          </a:bodyPr>
           <a:lstStyle/>
           <a:p>
-            <a:endParaRPr lang="de-DE" dirty="0"/>
+            <a:r>
+              <a:rPr lang="en-US" sz="3200" dirty="0"/>
+              <a:t>Organizing of data collections</a:t>
+            </a:r>
+            <a:endParaRPr lang="de-DE" sz="3200" dirty="0"/>
+          </a:p>
+        </p:txBody>
+      </p:sp>
+      <p:sp>
+        <p:nvSpPr>
+          <p:cNvPr id="11" name="Pfeil nach links und rechts 10"/>
+          <p:cNvSpPr/>
+          <p:nvPr/>
+        </p:nvSpPr>
+        <p:spPr>
+          <a:xfrm>
+            <a:off x="6362411" y="4954485"/>
+            <a:ext cx="1961533" cy="968263"/>
+          </a:xfrm>
+          <a:prstGeom prst="leftRightArrow">
+            <a:avLst/>
+          </a:prstGeom>
+        </p:spPr>
+        <p:style>
+          <a:lnRef idx="1">
+            <a:schemeClr val="accent1"/>
+          </a:lnRef>
+          <a:fillRef idx="3">
+            <a:schemeClr val="accent1"/>
+          </a:fillRef>
+          <a:effectRef idx="2">
+            <a:schemeClr val="accent1"/>
+          </a:effectRef>
+          <a:fontRef idx="minor">
+            <a:schemeClr val="lt1"/>
+          </a:fontRef>
+        </p:style>
+        <p:txBody>
+          <a:bodyPr rtlCol="0" anchor="ctr"/>
+          <a:lstStyle/>
+          <a:p>
+            <a:pPr algn="ctr"/>
+            <a:endParaRPr lang="de-DE"/>
+          </a:p>
+        </p:txBody>
+      </p:sp>
+      <p:sp>
+        <p:nvSpPr>
+          <p:cNvPr id="12" name="Textfeld 11"/>
+          <p:cNvSpPr txBox="1"/>
+          <p:nvPr/>
+        </p:nvSpPr>
+        <p:spPr>
+          <a:xfrm>
+            <a:off x="8776605" y="5117958"/>
+            <a:ext cx="1735203" cy="584776"/>
+          </a:xfrm>
+          <a:prstGeom prst="rect">
+            <a:avLst/>
+          </a:prstGeom>
+          <a:noFill/>
+        </p:spPr>
+        <p:txBody>
+          <a:bodyPr wrap="square" rtlCol="0">
+            <a:spAutoFit/>
+          </a:bodyPr>
+          <a:lstStyle/>
+          <a:p>
+            <a:r>
+              <a:rPr lang="de-DE" sz="3200" b="1" dirty="0" smtClean="0"/>
+              <a:t>SQL</a:t>
+            </a:r>
+            <a:endParaRPr lang="de-DE" sz="3200" b="1" dirty="0"/>
           </a:p>
         </p:txBody>
       </p:sp>
@@ -6129,31 +9271,85 @@
           <a:p>
             <a:r>
               <a:rPr lang="en-US" dirty="0" smtClean="0"/>
-              <a:t>Motivation</a:t>
+              <a:t>Learning </a:t>
+            </a:r>
+            <a:r>
+              <a:rPr lang="en-US" dirty="0"/>
+              <a:t>is </a:t>
+            </a:r>
+            <a:r>
+              <a:rPr lang="en-US" dirty="0" smtClean="0"/>
+              <a:t>arduous</a:t>
             </a:r>
             <a:endParaRPr lang="de-DE" dirty="0"/>
           </a:p>
         </p:txBody>
       </p:sp>
-      <p:sp>
-        <p:nvSpPr>
-          <p:cNvPr id="3" name="Content Placeholder 2"/>
-          <p:cNvSpPr>
-            <a:spLocks noGrp="1"/>
-          </p:cNvSpPr>
-          <p:nvPr>
-            <p:ph idx="1"/>
-          </p:nvPr>
-        </p:nvSpPr>
-        <p:spPr/>
-        <p:txBody>
-          <a:bodyPr/>
-          <a:lstStyle/>
-          <a:p>
-            <a:endParaRPr lang="de-DE"/>
-          </a:p>
-        </p:txBody>
-      </p:sp>
+      <p:pic>
+        <p:nvPicPr>
+          <p:cNvPr id="4" name="Bild 3" descr="sleep-learning1.jpg"/>
+          <p:cNvPicPr>
+            <a:picLocks noChangeAspect="1"/>
+          </p:cNvPicPr>
+          <p:nvPr/>
+        </p:nvPicPr>
+        <p:blipFill>
+          <a:blip r:embed="rId2">
+            <a:extLst>
+              <a:ext uri="{28A0092B-C50C-407E-A947-70E740481C1C}">
+                <a14:useLocalDpi xmlns:a14="http://schemas.microsoft.com/office/drawing/2010/main" val="0"/>
+              </a:ext>
+            </a:extLst>
+          </a:blip>
+          <a:stretch>
+            <a:fillRect/>
+          </a:stretch>
+        </p:blipFill>
+        <p:spPr>
+          <a:xfrm>
+            <a:off x="799158" y="1649749"/>
+            <a:ext cx="4636446" cy="3090964"/>
+          </a:xfrm>
+          <a:prstGeom prst="rect">
+            <a:avLst/>
+          </a:prstGeom>
+          <a:ln>
+            <a:solidFill>
+              <a:srgbClr val="BC451B"/>
+            </a:solidFill>
+          </a:ln>
+        </p:spPr>
+      </p:pic>
+      <p:pic>
+        <p:nvPicPr>
+          <p:cNvPr id="5" name="Bild 4" descr="NewPicture147.jpg"/>
+          <p:cNvPicPr>
+            <a:picLocks noChangeAspect="1"/>
+          </p:cNvPicPr>
+          <p:nvPr/>
+        </p:nvPicPr>
+        <p:blipFill>
+          <a:blip r:embed="rId3">
+            <a:extLst>
+              <a:ext uri="{28A0092B-C50C-407E-A947-70E740481C1C}">
+                <a14:useLocalDpi xmlns:a14="http://schemas.microsoft.com/office/drawing/2010/main" val="0"/>
+              </a:ext>
+            </a:extLst>
+          </a:blip>
+          <a:stretch>
+            <a:fillRect/>
+          </a:stretch>
+        </p:blipFill>
+        <p:spPr>
+          <a:xfrm>
+            <a:off x="5218183" y="2255362"/>
+            <a:ext cx="3301582" cy="4149943"/>
+          </a:xfrm>
+          <a:prstGeom prst="rect">
+            <a:avLst/>
+          </a:prstGeom>
+        </p:spPr>
+      </p:pic>
     </p:spTree>
     <p:extLst>
       <p:ext uri="{BB962C8B-B14F-4D97-AF65-F5344CB8AC3E}">
@@ -6200,32 +9396,42 @@
           <a:lstStyle/>
           <a:p>
             <a:r>
+              <a:rPr lang="en-US" dirty="0"/>
+              <a:t>Playing </a:t>
+            </a:r>
+            <a:r>
               <a:rPr lang="en-US" dirty="0" smtClean="0"/>
-              <a:t>Problem Definition</a:t>
+              <a:t>instead of learning</a:t>
             </a:r>
             <a:endParaRPr lang="de-DE" dirty="0"/>
           </a:p>
         </p:txBody>
       </p:sp>
-      <p:sp>
-        <p:nvSpPr>
-          <p:cNvPr id="3" name="Content Placeholder 2"/>
-          <p:cNvSpPr>
-            <a:spLocks noGrp="1"/>
-          </p:cNvSpPr>
+      <p:graphicFrame>
+        <p:nvGraphicFramePr>
+          <p:cNvPr id="9" name="Inhaltsplatzhalter 8"/>
+          <p:cNvGraphicFramePr>
+            <a:graphicFrameLocks noGrp="1"/>
+          </p:cNvGraphicFramePr>
           <p:nvPr>
             <p:ph idx="1"/>
-          </p:nvPr>
-        </p:nvSpPr>
-        <p:spPr/>
-        <p:txBody>
-          <a:bodyPr/>
-          <a:lstStyle/>
-          <a:p>
-            <a:endParaRPr lang="de-DE"/>
-          </a:p>
-        </p:txBody>
-      </p:sp>
+            <p:extLst>
+              <p:ext uri="{D42A27DB-BD31-4B8C-83A1-F6EECF244321}">
+                <p14:modId xmlns:p14="http://schemas.microsoft.com/office/powerpoint/2010/main" val="933801711"/>
+              </p:ext>
+            </p:extLst>
+          </p:nvPr>
+        </p:nvGraphicFramePr>
+        <p:xfrm>
+          <a:off x="939548" y="2058908"/>
+          <a:ext cx="10353675" cy="4059237"/>
+        </p:xfrm>
+        <a:graphic>
+          <a:graphicData uri="http://schemas.openxmlformats.org/drawingml/2006/diagram">
+            <dgm:relIds xmlns:dgm="http://schemas.openxmlformats.org/drawingml/2006/diagram" xmlns:r="http://schemas.openxmlformats.org/officeDocument/2006/relationships" r:dm="rId2" r:lo="rId3" r:qs="rId4" r:cs="rId5"/>
+          </a:graphicData>
+        </a:graphic>
+      </p:graphicFrame>
     </p:spTree>
     <p:extLst>
       <p:ext uri="{BB962C8B-B14F-4D97-AF65-F5344CB8AC3E}">
@@ -6628,7 +9834,7 @@
     </a:clrScheme>
     <a:fontScheme name="Slate">
       <a:majorFont>
-        <a:latin typeface="Calisto MT" panose="02040603050505030304"/>
+        <a:latin typeface="Calisto MT"/>
         <a:ea typeface=""/>
         <a:cs typeface=""/>
         <a:font script="Jpan" typeface="ＭＳ Ｐゴシック"/>
@@ -6663,7 +9869,7 @@
         <a:font script="Geor" typeface="Sylfaen"/>
       </a:majorFont>
       <a:minorFont>
-        <a:latin typeface="Calisto MT" panose="02040603050505030304"/>
+        <a:latin typeface="Calisto MT"/>
         <a:ea typeface=""/>
         <a:cs typeface=""/>
         <a:font script="Jpan" typeface="ＭＳ Ｐゴシック"/>
@@ -6821,7 +10027,7 @@
   <a:extraClrSchemeLst/>
   <a:extLst>
     <a:ext uri="{05A4C25C-085E-4340-85A3-A5531E510DB2}">
-      <thm15:themeFamily xmlns:thm15="http://schemas.microsoft.com/office/thememl/2012/main" name="Slate" id="{C3F70B94-7CE9-428E-ADC1-3269CC2C3385}" vid="{3F2DE9A5-64E6-437C-A389-CC4477E817E8}"/>
+      <thm15:themeFamily xmlns:thm15="http://schemas.microsoft.com/office/thememl/2012/main" xmlns="" name="Slate" id="{C3F70B94-7CE9-428E-ADC1-3269CC2C3385}" vid="{3F2DE9A5-64E6-437C-A389-CC4477E817E8}"/>
     </a:ext>
   </a:extLst>
 </a:theme>

</xml_diff>

<commit_message>
pdf version of sliders added
</commit_message>
<xml_diff>
--- a/presentation/Enjoy-SQL.pptx
+++ b/presentation/Enjoy-SQL.pptx
@@ -930,27 +930,7 @@
           </a:r>
           <a:r>
             <a:rPr lang="en-US" dirty="0" smtClean="0"/>
-            <a:t>:</a:t>
-          </a:r>
-          <a:r>
-            <a:rPr lang="de-DE" dirty="0" smtClean="0"/>
-            <a:t>Player </a:t>
-          </a:r>
-          <a:r>
-            <a:rPr lang="de-DE" dirty="0" err="1" smtClean="0"/>
-            <a:t>can</a:t>
-          </a:r>
-          <a:r>
-            <a:rPr lang="de-DE" dirty="0" err="1" smtClean="0"/>
-            <a:t>´</a:t>
-          </a:r>
-          <a:r>
-            <a:rPr lang="de-DE" dirty="0" err="1" smtClean="0"/>
-            <a:t>t</a:t>
-          </a:r>
-          <a:r>
-            <a:rPr lang="de-DE" dirty="0" smtClean="0"/>
-            <a:t> SQL</a:t>
+            <a:t>: Player doesn't know SQL</a:t>
           </a:r>
           <a:endParaRPr lang="de-DE" dirty="0"/>
         </a:p>
@@ -1078,14 +1058,35 @@
         </dgm:presLayoutVars>
       </dgm:prSet>
       <dgm:spPr/>
+      <dgm:t>
+        <a:bodyPr/>
+        <a:lstStyle/>
+        <a:p>
+          <a:endParaRPr lang="de-DE"/>
+        </a:p>
+      </dgm:t>
     </dgm:pt>
     <dgm:pt modelId="{6BE7EDEF-7A79-3840-9CEE-1B2C25B70CFE}" type="pres">
       <dgm:prSet presAssocID="{8FE0CD23-DE32-B64C-9C6B-915A8556AF6F}" presName="centerShape" presStyleLbl="node0" presStyleIdx="0" presStyleCnt="1"/>
       <dgm:spPr/>
+      <dgm:t>
+        <a:bodyPr/>
+        <a:lstStyle/>
+        <a:p>
+          <a:endParaRPr lang="de-DE"/>
+        </a:p>
+      </dgm:t>
     </dgm:pt>
     <dgm:pt modelId="{CF825D73-F4A9-304B-BE24-354463AF9862}" type="pres">
       <dgm:prSet presAssocID="{63AE766D-E07C-9247-AFAD-8B06B9EC7C7B}" presName="parTrans" presStyleLbl="bgSibTrans2D1" presStyleIdx="0" presStyleCnt="3"/>
       <dgm:spPr/>
+      <dgm:t>
+        <a:bodyPr/>
+        <a:lstStyle/>
+        <a:p>
+          <a:endParaRPr lang="de-DE"/>
+        </a:p>
+      </dgm:t>
     </dgm:pt>
     <dgm:pt modelId="{B587CFA2-4110-8A47-84EC-3D69A2EEF650}" type="pres">
       <dgm:prSet presAssocID="{3C2AC3AE-4E15-D34A-BD48-E973C38784B2}" presName="node" presStyleLbl="node1" presStyleIdx="0" presStyleCnt="3" custScaleX="161299" custScaleY="103535" custRadScaleRad="149509" custRadScaleInc="-2739">
@@ -1105,6 +1106,13 @@
     <dgm:pt modelId="{23786414-4395-004A-BAB4-10A34BCB6A2A}" type="pres">
       <dgm:prSet presAssocID="{50366D02-24AE-1B4E-B39E-E27114D07EDE}" presName="parTrans" presStyleLbl="bgSibTrans2D1" presStyleIdx="1" presStyleCnt="3"/>
       <dgm:spPr/>
+      <dgm:t>
+        <a:bodyPr/>
+        <a:lstStyle/>
+        <a:p>
+          <a:endParaRPr lang="de-DE"/>
+        </a:p>
+      </dgm:t>
     </dgm:pt>
     <dgm:pt modelId="{CB115302-BA9B-4145-AF35-3A193391AF62}" type="pres">
       <dgm:prSet presAssocID="{5290DF40-A8B4-284B-B19D-A7F385D1D770}" presName="node" presStyleLbl="node1" presStyleIdx="1" presStyleCnt="3">
@@ -1124,6 +1132,13 @@
     <dgm:pt modelId="{DDC0CF13-2C00-0645-8DBC-70114DA4ED93}" type="pres">
       <dgm:prSet presAssocID="{DB39F4EC-1151-DD41-90B6-B9495A8CCEA3}" presName="parTrans" presStyleLbl="bgSibTrans2D1" presStyleIdx="2" presStyleCnt="3"/>
       <dgm:spPr/>
+      <dgm:t>
+        <a:bodyPr/>
+        <a:lstStyle/>
+        <a:p>
+          <a:endParaRPr lang="de-DE"/>
+        </a:p>
+      </dgm:t>
     </dgm:pt>
     <dgm:pt modelId="{C100763A-31C3-2047-9F09-97BC4CF9F8CF}" type="pres">
       <dgm:prSet presAssocID="{25052E41-D85C-D34D-9436-5CE1414D603A}" presName="node" presStyleLbl="node1" presStyleIdx="2" presStyleCnt="3" custScaleX="170458" custRadScaleRad="148583" custRadScaleInc="7452">
@@ -1407,12 +1422,12 @@
         </a:fontRef>
       </dsp:style>
       <dsp:txBody>
-        <a:bodyPr spcFirstLastPara="0" vert="horz" wrap="square" lIns="47625" tIns="47625" rIns="47625" bIns="47625" numCol="1" spcCol="1270" anchor="ctr" anchorCtr="0">
+        <a:bodyPr spcFirstLastPara="0" vert="horz" wrap="square" lIns="53340" tIns="53340" rIns="53340" bIns="53340" numCol="1" spcCol="1270" anchor="ctr" anchorCtr="0">
           <a:noAutofit/>
         </a:bodyPr>
         <a:lstStyle/>
         <a:p>
-          <a:pPr lvl="0" algn="ctr" defTabSz="1111250">
+          <a:pPr lvl="0" algn="ctr" defTabSz="1244600">
             <a:lnSpc>
               <a:spcPct val="90000"/>
             </a:lnSpc>
@@ -1424,38 +1439,18 @@
             </a:spcAft>
           </a:pPr>
           <a:r>
-            <a:rPr lang="de-DE" sz="2500" kern="1200" dirty="0" smtClean="0"/>
+            <a:rPr lang="de-DE" sz="2800" kern="1200" dirty="0" smtClean="0"/>
             <a:t>A</a:t>
           </a:r>
           <a:r>
-            <a:rPr lang="en-US" sz="2500" kern="1200" dirty="0" err="1" smtClean="0"/>
+            <a:rPr lang="en-US" sz="2800" kern="1200" dirty="0" err="1" smtClean="0"/>
             <a:t>ssumption</a:t>
           </a:r>
           <a:r>
-            <a:rPr lang="en-US" sz="2500" kern="1200" dirty="0" smtClean="0"/>
-            <a:t>:</a:t>
+            <a:rPr lang="en-US" sz="2800" kern="1200" dirty="0" smtClean="0"/>
+            <a:t>: Player doesn't know SQL</a:t>
           </a:r>
-          <a:r>
-            <a:rPr lang="de-DE" sz="2500" kern="1200" dirty="0" smtClean="0"/>
-            <a:t>Player </a:t>
-          </a:r>
-          <a:r>
-            <a:rPr lang="de-DE" sz="2500" kern="1200" dirty="0" err="1" smtClean="0"/>
-            <a:t>can</a:t>
-          </a:r>
-          <a:r>
-            <a:rPr lang="de-DE" sz="2500" kern="1200" dirty="0" err="1" smtClean="0"/>
-            <a:t>´</a:t>
-          </a:r>
-          <a:r>
-            <a:rPr lang="de-DE" sz="2500" kern="1200" dirty="0" err="1" smtClean="0"/>
-            <a:t>t</a:t>
-          </a:r>
-          <a:r>
-            <a:rPr lang="de-DE" sz="2500" kern="1200" dirty="0" smtClean="0"/>
-            <a:t> SQL</a:t>
-          </a:r>
-          <a:endParaRPr lang="de-DE" sz="2500" kern="1200" dirty="0"/>
+          <a:endParaRPr lang="de-DE" sz="2800" kern="1200" dirty="0"/>
         </a:p>
       </dsp:txBody>
       <dsp:txXfrm>
@@ -1598,12 +1593,12 @@
         </a:fontRef>
       </dsp:style>
       <dsp:txBody>
-        <a:bodyPr spcFirstLastPara="0" vert="horz" wrap="square" lIns="47625" tIns="47625" rIns="47625" bIns="47625" numCol="1" spcCol="1270" anchor="ctr" anchorCtr="0">
+        <a:bodyPr spcFirstLastPara="0" vert="horz" wrap="square" lIns="53340" tIns="53340" rIns="53340" bIns="53340" numCol="1" spcCol="1270" anchor="ctr" anchorCtr="0">
           <a:noAutofit/>
         </a:bodyPr>
         <a:lstStyle/>
         <a:p>
-          <a:pPr lvl="0" algn="ctr" defTabSz="1111250">
+          <a:pPr lvl="0" algn="ctr" defTabSz="1244600">
             <a:lnSpc>
               <a:spcPct val="90000"/>
             </a:lnSpc>
@@ -1615,14 +1610,14 @@
             </a:spcAft>
           </a:pPr>
           <a:r>
-            <a:rPr lang="en-US" sz="2500" b="0" kern="1200" dirty="0" smtClean="0"/>
+            <a:rPr lang="en-US" sz="2800" b="0" kern="1200" dirty="0" smtClean="0"/>
             <a:t>Gameplay</a:t>
           </a:r>
           <a:r>
-            <a:rPr lang="en-US" sz="2500" b="1" kern="1200" dirty="0" smtClean="0"/>
+            <a:rPr lang="en-US" sz="2800" b="1" kern="1200" dirty="0" smtClean="0"/>
             <a:t> is fun</a:t>
           </a:r>
-          <a:endParaRPr lang="de-DE" sz="2500" b="1" kern="1200" dirty="0"/>
+          <a:endParaRPr lang="de-DE" sz="2800" b="1" kern="1200" dirty="0"/>
         </a:p>
       </dsp:txBody>
       <dsp:txXfrm>
@@ -1765,12 +1760,12 @@
         </a:fontRef>
       </dsp:style>
       <dsp:txBody>
-        <a:bodyPr spcFirstLastPara="0" vert="horz" wrap="square" lIns="47625" tIns="47625" rIns="47625" bIns="47625" numCol="1" spcCol="1270" anchor="ctr" anchorCtr="0">
+        <a:bodyPr spcFirstLastPara="0" vert="horz" wrap="square" lIns="53340" tIns="53340" rIns="53340" bIns="53340" numCol="1" spcCol="1270" anchor="ctr" anchorCtr="0">
           <a:noAutofit/>
         </a:bodyPr>
         <a:lstStyle/>
         <a:p>
-          <a:pPr lvl="0" algn="ctr" defTabSz="1111250">
+          <a:pPr lvl="0" algn="ctr" defTabSz="1244600">
             <a:lnSpc>
               <a:spcPct val="90000"/>
             </a:lnSpc>
@@ -1782,22 +1777,22 @@
             </a:spcAft>
           </a:pPr>
           <a:r>
-            <a:rPr lang="de-DE" sz="2500" kern="1200" dirty="0" smtClean="0"/>
+            <a:rPr lang="de-DE" sz="2800" kern="1200" dirty="0" smtClean="0"/>
             <a:t>Goal: Player </a:t>
           </a:r>
           <a:r>
-            <a:rPr lang="it-IT" sz="2500" kern="1200" dirty="0" err="1" smtClean="0"/>
+            <a:rPr lang="it-IT" sz="2800" kern="1200" dirty="0" err="1" smtClean="0"/>
             <a:t>improves</a:t>
           </a:r>
           <a:r>
-            <a:rPr lang="it-IT" sz="2500" kern="1200" dirty="0" smtClean="0"/>
+            <a:rPr lang="it-IT" sz="2800" kern="1200" dirty="0" smtClean="0"/>
             <a:t> SQL </a:t>
           </a:r>
           <a:r>
-            <a:rPr lang="en-US" sz="2500" kern="1200" dirty="0" smtClean="0"/>
+            <a:rPr lang="en-US" sz="2800" kern="1200" dirty="0" smtClean="0"/>
             <a:t>knowledge</a:t>
           </a:r>
-          <a:endParaRPr lang="de-DE" sz="2500" kern="1200" dirty="0"/>
+          <a:endParaRPr lang="de-DE" sz="2800" kern="1200" dirty="0"/>
         </a:p>
       </dsp:txBody>
       <dsp:txXfrm>
@@ -3289,7 +3284,7 @@
             <a:fld id="{8E36636D-D922-432D-A958-524484B5923D}" type="datetimeFigureOut">
               <a:rPr lang="en-US" dirty="0"/>
               <a:pPr/>
-              <a:t>07.12.13</a:t>
+              <a:t>08.12.13</a:t>
             </a:fld>
             <a:endParaRPr lang="en-US" dirty="0"/>
           </a:p>
@@ -3583,7 +3578,7 @@
           <a:p>
             <a:fld id="{48A87A34-81AB-432B-8DAE-1953F412C126}" type="datetimeFigureOut">
               <a:rPr lang="en-US" dirty="0"/>
-              <a:t>07.12.13</a:t>
+              <a:t>08.12.13</a:t>
             </a:fld>
             <a:endParaRPr lang="en-US" dirty="0"/>
           </a:p>
@@ -3770,7 +3765,7 @@
           <a:p>
             <a:fld id="{48A87A34-81AB-432B-8DAE-1953F412C126}" type="datetimeFigureOut">
               <a:rPr lang="en-US" dirty="0"/>
-              <a:t>07.12.13</a:t>
+              <a:t>08.12.13</a:t>
             </a:fld>
             <a:endParaRPr lang="en-US" dirty="0"/>
           </a:p>
@@ -4026,7 +4021,7 @@
           <a:p>
             <a:fld id="{48A87A34-81AB-432B-8DAE-1953F412C126}" type="datetimeFigureOut">
               <a:rPr lang="en-US" dirty="0"/>
-              <a:t>07.12.13</a:t>
+              <a:t>08.12.13</a:t>
             </a:fld>
             <a:endParaRPr lang="en-US" dirty="0"/>
           </a:p>
@@ -4445,7 +4440,7 @@
           <a:p>
             <a:fld id="{48A87A34-81AB-432B-8DAE-1953F412C126}" type="datetimeFigureOut">
               <a:rPr lang="en-US" dirty="0"/>
-              <a:t>07.12.13</a:t>
+              <a:t>08.12.13</a:t>
             </a:fld>
             <a:endParaRPr lang="en-US" dirty="0"/>
           </a:p>
@@ -4977,7 +4972,7 @@
           <a:p>
             <a:fld id="{48A87A34-81AB-432B-8DAE-1953F412C126}" type="datetimeFigureOut">
               <a:rPr lang="en-US" dirty="0"/>
-              <a:t>07.12.13</a:t>
+              <a:t>08.12.13</a:t>
             </a:fld>
             <a:endParaRPr lang="en-US" dirty="0"/>
           </a:p>
@@ -5836,7 +5831,7 @@
           <a:p>
             <a:fld id="{48A87A34-81AB-432B-8DAE-1953F412C126}" type="datetimeFigureOut">
               <a:rPr lang="en-US" dirty="0"/>
-              <a:t>07.12.13</a:t>
+              <a:t>08.12.13</a:t>
             </a:fld>
             <a:endParaRPr lang="en-US" dirty="0"/>
           </a:p>
@@ -6002,7 +5997,7 @@
             <a:fld id="{8E36636D-D922-432D-A958-524484B5923D}" type="datetimeFigureOut">
               <a:rPr lang="en-US" dirty="0"/>
               <a:pPr/>
-              <a:t>07.12.13</a:t>
+              <a:t>08.12.13</a:t>
             </a:fld>
             <a:endParaRPr lang="en-US" dirty="0"/>
           </a:p>
@@ -6183,7 +6178,7 @@
             <a:fld id="{8E36636D-D922-432D-A958-524484B5923D}" type="datetimeFigureOut">
               <a:rPr lang="en-US" dirty="0"/>
               <a:pPr/>
-              <a:t>07.12.13</a:t>
+              <a:t>08.12.13</a:t>
             </a:fld>
             <a:endParaRPr lang="en-US" dirty="0"/>
           </a:p>
@@ -6350,7 +6345,7 @@
             <a:fld id="{8E36636D-D922-432D-A958-524484B5923D}" type="datetimeFigureOut">
               <a:rPr lang="en-US" dirty="0"/>
               <a:pPr/>
-              <a:t>07.12.13</a:t>
+              <a:t>08.12.13</a:t>
             </a:fld>
             <a:endParaRPr lang="en-US" dirty="0"/>
           </a:p>
@@ -6591,7 +6586,7 @@
             <a:fld id="{8E36636D-D922-432D-A958-524484B5923D}" type="datetimeFigureOut">
               <a:rPr lang="en-US" dirty="0"/>
               <a:pPr/>
-              <a:t>07.12.13</a:t>
+              <a:t>08.12.13</a:t>
             </a:fld>
             <a:endParaRPr lang="en-US" dirty="0"/>
           </a:p>
@@ -6824,7 +6819,7 @@
             <a:fld id="{8E36636D-D922-432D-A958-524484B5923D}" type="datetimeFigureOut">
               <a:rPr lang="en-US" dirty="0"/>
               <a:pPr/>
-              <a:t>07.12.13</a:t>
+              <a:t>08.12.13</a:t>
             </a:fld>
             <a:endParaRPr lang="en-US" dirty="0"/>
           </a:p>
@@ -7287,7 +7282,7 @@
             <a:fld id="{8E36636D-D922-432D-A958-524484B5923D}" type="datetimeFigureOut">
               <a:rPr lang="en-US" dirty="0"/>
               <a:pPr/>
-              <a:t>07.12.13</a:t>
+              <a:t>08.12.13</a:t>
             </a:fld>
             <a:endParaRPr lang="en-US" dirty="0"/>
           </a:p>
@@ -7402,7 +7397,7 @@
             <a:fld id="{8E36636D-D922-432D-A958-524484B5923D}" type="datetimeFigureOut">
               <a:rPr lang="en-US" dirty="0"/>
               <a:pPr/>
-              <a:t>07.12.13</a:t>
+              <a:t>08.12.13</a:t>
             </a:fld>
             <a:endParaRPr lang="en-US" dirty="0"/>
           </a:p>
@@ -7494,7 +7489,7 @@
             <a:fld id="{8E36636D-D922-432D-A958-524484B5923D}" type="datetimeFigureOut">
               <a:rPr lang="en-US" dirty="0"/>
               <a:pPr/>
-              <a:t>07.12.13</a:t>
+              <a:t>08.12.13</a:t>
             </a:fld>
             <a:endParaRPr lang="en-US" dirty="0"/>
           </a:p>
@@ -7746,7 +7741,7 @@
             <a:fld id="{8E36636D-D922-432D-A958-524484B5923D}" type="datetimeFigureOut">
               <a:rPr lang="en-US" dirty="0"/>
               <a:pPr/>
-              <a:t>07.12.13</a:t>
+              <a:t>08.12.13</a:t>
             </a:fld>
             <a:endParaRPr lang="en-US" dirty="0"/>
           </a:p>
@@ -8043,7 +8038,7 @@
             <a:fld id="{8E36636D-D922-432D-A958-524484B5923D}" type="datetimeFigureOut">
               <a:rPr lang="en-US" dirty="0"/>
               <a:pPr/>
-              <a:t>07.12.13</a:t>
+              <a:t>08.12.13</a:t>
             </a:fld>
             <a:endParaRPr lang="en-US" dirty="0"/>
           </a:p>
@@ -8274,7 +8269,7 @@
             <a:fld id="{8E36636D-D922-432D-A958-524484B5923D}" type="datetimeFigureOut">
               <a:rPr lang="en-US" dirty="0"/>
               <a:pPr/>
-              <a:t>07.12.13</a:t>
+              <a:t>08.12.13</a:t>
             </a:fld>
             <a:endParaRPr lang="en-US" dirty="0"/>
           </a:p>
@@ -9417,7 +9412,7 @@
             <p:ph idx="1"/>
             <p:extLst>
               <p:ext uri="{D42A27DB-BD31-4B8C-83A1-F6EECF244321}">
-                <p14:modId xmlns:p14="http://schemas.microsoft.com/office/powerpoint/2010/main" val="933801711"/>
+                <p14:modId xmlns:p14="http://schemas.microsoft.com/office/powerpoint/2010/main" val="3331725218"/>
               </p:ext>
             </p:extLst>
           </p:nvPr>
@@ -10027,7 +10022,7 @@
   <a:extraClrSchemeLst/>
   <a:extLst>
     <a:ext uri="{05A4C25C-085E-4340-85A3-A5531E510DB2}">
-      <thm15:themeFamily xmlns:thm15="http://schemas.microsoft.com/office/thememl/2012/main" xmlns="" name="Slate" id="{C3F70B94-7CE9-428E-ADC1-3269CC2C3385}" vid="{3F2DE9A5-64E6-437C-A389-CC4477E817E8}"/>
+      <thm15:themeFamily xmlns="" xmlns:thm15="http://schemas.microsoft.com/office/thememl/2012/main" name="Slate" id="{C3F70B94-7CE9-428E-ADC1-3269CC2C3385}" vid="{3F2DE9A5-64E6-437C-A389-CC4477E817E8}"/>
     </a:ext>
   </a:extLst>
 </a:theme>

</xml_diff>